<commit_message>
Generate new powerpoint with subtitles based on songs.
</commit_message>
<xml_diff>
--- a/DeBron.PowerPoint.Builder/DeBron.PowerPoint.Builder/template.pptx
+++ b/DeBron.PowerPoint.Builder/DeBron.PowerPoint.Builder/template.pptx
@@ -1,6 +1,6 @@
 
 <file path=ppt/presentation.xml><?xml version="1.0" encoding="utf-8"?>
-<p:presentation xmlns:a="http://schemas.openxmlformats.org/drawingml/2006/main" xmlns:r="http://schemas.openxmlformats.org/officeDocument/2006/relationships" xmlns:p="http://schemas.openxmlformats.org/presentationml/2006/main" saveSubsetFonts="1" autoCompressPictures="0">
+<p:presentation xmlns:p15="http://schemas.microsoft.com/office/powerpoint/2012/main" xmlns:a="http://schemas.openxmlformats.org/drawingml/2006/main" xmlns:r="http://schemas.openxmlformats.org/officeDocument/2006/relationships" xmlns:p="http://schemas.openxmlformats.org/presentationml/2006/main" saveSubsetFonts="1" autoCompressPictures="0">
   <p:sldMasterIdLst>
     <p:sldMasterId id="2147483660" r:id="rId4"/>
   </p:sldMasterIdLst>
@@ -9,6 +9,8 @@
   </p:notesMasterIdLst>
   <p:sldIdLst>
     <p:sldId id="3196" r:id="rId5"/>
+    <p:sldId id="3197" r:id="Rec6ca14c14ae4c7e"/>
+    <p:sldId id="3198" r:id="R3bc6e16e80fe4f14"/>
   </p:sldIdLst>
   <p:sldSz cx="12192000" cy="6858000"/>
   <p:notesSz cx="6858000" cy="9144000"/>
@@ -2657,7 +2659,7 @@
           <a:p>
             <a:fld id="{2DC0BB24-8F05-8E4F-8EF0-B18B6E22EC56}" type="datetimeFigureOut">
               <a:rPr lang="en-NL" smtClean="0"/>
-              <a:t>05/21/2025</a:t>
+              <a:t>05/22/2025</a:t>
             </a:fld>
             <a:endParaRPr lang="en-NL"/>
           </a:p>
@@ -3028,14 +3030,14 @@
           </a:ln>
           <a:extLst>
             <a:ext uri="{909E8E84-426E-40dd-AFC4-6F175D3DCCD1}">
-              <a14:hiddenFill xmlns="" xmlns:a14="http://schemas.microsoft.com/office/drawing/2010/main">
+              <a14:hiddenFill xmlns:a14="http://schemas.microsoft.com/office/drawing/2010/main" xmlns="">
                 <a:solidFill>
                   <a:srgbClr val="FFFFFF"/>
                 </a:solidFill>
               </a14:hiddenFill>
             </a:ext>
             <a:ext uri="{91240B29-F687-4f45-9708-019B960494DF}">
-              <a14:hiddenLine xmlns="" xmlns:a14="http://schemas.microsoft.com/office/drawing/2010/main" w="9525">
+              <a14:hiddenLine xmlns:a14="http://schemas.microsoft.com/office/drawing/2010/main" xmlns="" w="9525">
                 <a:solidFill>
                   <a:srgbClr val="000000"/>
                 </a:solidFill>
@@ -3520,14 +3522,14 @@
           </a:ln>
           <a:extLst>
             <a:ext uri="{909E8E84-426E-40dd-AFC4-6F175D3DCCD1}">
-              <a14:hiddenFill xmlns="" xmlns:a14="http://schemas.microsoft.com/office/drawing/2010/main">
+              <a14:hiddenFill xmlns:a14="http://schemas.microsoft.com/office/drawing/2010/main" xmlns="">
                 <a:solidFill>
                   <a:srgbClr val="FFFFFF"/>
                 </a:solidFill>
               </a14:hiddenFill>
             </a:ext>
             <a:ext uri="{91240B29-F687-4f45-9708-019B960494DF}">
-              <a14:hiddenLine xmlns="" xmlns:a14="http://schemas.microsoft.com/office/drawing/2010/main" w="9525">
+              <a14:hiddenLine xmlns:a14="http://schemas.microsoft.com/office/drawing/2010/main" xmlns="" w="9525">
                 <a:solidFill>
                   <a:srgbClr val="000000"/>
                 </a:solidFill>
@@ -4063,14 +4065,14 @@
           </a:ln>
           <a:extLst>
             <a:ext uri="{909E8E84-426E-40dd-AFC4-6F175D3DCCD1}">
-              <a14:hiddenFill xmlns:a14="http://schemas.microsoft.com/office/drawing/2010/main" xmlns="">
+              <a14:hiddenFill xmlns="" xmlns:a14="http://schemas.microsoft.com/office/drawing/2010/main">
                 <a:solidFill>
                   <a:srgbClr val="FFFFFF"/>
                 </a:solidFill>
               </a14:hiddenFill>
             </a:ext>
             <a:ext uri="{91240B29-F687-4f45-9708-019B960494DF}">
-              <a14:hiddenLine xmlns:a14="http://schemas.microsoft.com/office/drawing/2010/main" xmlns="" w="9525">
+              <a14:hiddenLine xmlns="" xmlns:a14="http://schemas.microsoft.com/office/drawing/2010/main" w="9525">
                 <a:solidFill>
                   <a:srgbClr val="000000"/>
                 </a:solidFill>
@@ -4902,7 +4904,7 @@
 </file>
 
 <file path=ppt/slides/slide1.xml><?xml version="1.0" encoding="utf-8"?>
-<p:sld xmlns:a="http://schemas.openxmlformats.org/drawingml/2006/main" xmlns:r="http://schemas.openxmlformats.org/officeDocument/2006/relationships" xmlns:p="http://schemas.openxmlformats.org/presentationml/2006/main">
+<p:sld xmlns:a16="http://schemas.microsoft.com/office/drawing/2014/main" xmlns:p14="http://schemas.microsoft.com/office/powerpoint/2010/main" xmlns:a="http://schemas.openxmlformats.org/drawingml/2006/main" xmlns:r="http://schemas.openxmlformats.org/officeDocument/2006/relationships" xmlns:p="http://schemas.openxmlformats.org/presentationml/2006/main">
   <p:cSld>
     <p:spTree>
       <p:nvGrpSpPr>
@@ -4944,7 +4946,137 @@
           <a:bodyPr/>
           <a:lstStyle/>
           <a:p>
-            <a:endParaRPr lang="nl-NL" dirty="0"/>
+            <a:r>
+              <a:rPr lang="nl-NL" dirty="0"/>
+              <a:t>{{ondertiteling}}</a:t>
+            </a:r>
+          </a:p>
+        </p:txBody>
+      </p:sp>
+    </p:spTree>
+    <p:extLst>
+      <p:ext uri="{BB962C8B-B14F-4D97-AF65-F5344CB8AC3E}">
+        <p14:creationId xmlns:p14="http://schemas.microsoft.com/office/powerpoint/2010/main" val="367730310"/>
+      </p:ext>
+    </p:extLst>
+  </p:cSld>
+  <p:clrMapOvr>
+    <a:masterClrMapping/>
+  </p:clrMapOvr>
+</p:sld>
+</file>
+
+<file path=ppt/slides/slide2.xml><?xml version="1.0" encoding="utf-8"?>
+<p:sld xmlns:a16="http://schemas.microsoft.com/office/drawing/2014/main" xmlns:p14="http://schemas.microsoft.com/office/powerpoint/2010/main" xmlns:a="http://schemas.openxmlformats.org/drawingml/2006/main" xmlns:r="http://schemas.openxmlformats.org/officeDocument/2006/relationships" xmlns:p="http://schemas.openxmlformats.org/presentationml/2006/main">
+  <p:cSld>
+    <p:spTree>
+      <p:nvGrpSpPr>
+        <p:cNvPr id="1" name=""/>
+        <p:cNvGrpSpPr/>
+        <p:nvPr/>
+      </p:nvGrpSpPr>
+      <p:grpSpPr>
+        <a:xfrm>
+          <a:off x="0" y="0"/>
+          <a:ext cx="0" cy="0"/>
+          <a:chOff x="0" y="0"/>
+          <a:chExt cx="0" cy="0"/>
+        </a:xfrm>
+      </p:grpSpPr>
+      <p:sp>
+        <p:nvSpPr>
+          <p:cNvPr id="2" name="Titel 1">
+            <a:extLst>
+              <a:ext uri="{FF2B5EF4-FFF2-40B4-BE49-F238E27FC236}">
+                <a16:creationId xmlns:a16="http://schemas.microsoft.com/office/drawing/2014/main" id="{72744947-FD43-940C-6C1E-0CDE8A056130}"/>
+              </a:ext>
+            </a:extLst>
+          </p:cNvPr>
+          <p:cNvSpPr>
+            <a:spLocks noGrp="1"/>
+          </p:cNvSpPr>
+          <p:nvPr>
+            <p:ph type="title"/>
+          </p:nvPr>
+        </p:nvSpPr>
+        <p:spPr>
+          <a:xfrm>
+            <a:off x="838200" y="5233458"/>
+            <a:ext cx="10515600" cy="1325563"/>
+          </a:xfrm>
+        </p:spPr>
+        <p:txBody>
+          <a:bodyPr/>
+          <a:lstStyle/>
+          <a:p>
+            <a:r>
+              <a:rPr lang="nl-NL" dirty="0"/>
+              <a:t>Eerste regel,
+Tweede regel,</a:t>
+            </a:r>
+          </a:p>
+        </p:txBody>
+      </p:sp>
+    </p:spTree>
+    <p:extLst>
+      <p:ext uri="{BB962C8B-B14F-4D97-AF65-F5344CB8AC3E}">
+        <p14:creationId xmlns:p14="http://schemas.microsoft.com/office/powerpoint/2010/main" val="367730310"/>
+      </p:ext>
+    </p:extLst>
+  </p:cSld>
+  <p:clrMapOvr>
+    <a:masterClrMapping/>
+  </p:clrMapOvr>
+</p:sld>
+</file>
+
+<file path=ppt/slides/slide3.xml><?xml version="1.0" encoding="utf-8"?>
+<p:sld xmlns:a16="http://schemas.microsoft.com/office/drawing/2014/main" xmlns:p14="http://schemas.microsoft.com/office/powerpoint/2010/main" xmlns:a="http://schemas.openxmlformats.org/drawingml/2006/main" xmlns:r="http://schemas.openxmlformats.org/officeDocument/2006/relationships" xmlns:p="http://schemas.openxmlformats.org/presentationml/2006/main">
+  <p:cSld>
+    <p:spTree>
+      <p:nvGrpSpPr>
+        <p:cNvPr id="1" name=""/>
+        <p:cNvGrpSpPr/>
+        <p:nvPr/>
+      </p:nvGrpSpPr>
+      <p:grpSpPr>
+        <a:xfrm>
+          <a:off x="0" y="0"/>
+          <a:ext cx="0" cy="0"/>
+          <a:chOff x="0" y="0"/>
+          <a:chExt cx="0" cy="0"/>
+        </a:xfrm>
+      </p:grpSpPr>
+      <p:sp>
+        <p:nvSpPr>
+          <p:cNvPr id="2" name="Titel 1">
+            <a:extLst>
+              <a:ext uri="{FF2B5EF4-FFF2-40B4-BE49-F238E27FC236}">
+                <a16:creationId xmlns:a16="http://schemas.microsoft.com/office/drawing/2014/main" id="{72744947-FD43-940C-6C1E-0CDE8A056130}"/>
+              </a:ext>
+            </a:extLst>
+          </p:cNvPr>
+          <p:cNvSpPr>
+            <a:spLocks noGrp="1"/>
+          </p:cNvSpPr>
+          <p:nvPr>
+            <p:ph type="title"/>
+          </p:nvPr>
+        </p:nvSpPr>
+        <p:spPr>
+          <a:xfrm>
+            <a:off x="838200" y="5233458"/>
+            <a:ext cx="10515600" cy="1325563"/>
+          </a:xfrm>
+        </p:spPr>
+        <p:txBody>
+          <a:bodyPr/>
+          <a:lstStyle/>
+          <a:p>
+            <a:r>
+              <a:rPr lang="nl-NL" dirty="0"/>
+              <a:t>Derde regel</a:t>
+            </a:r>
           </a:p>
         </p:txBody>
       </p:sp>
@@ -5552,21 +5684,6 @@
 </file>
 
 <file path=customXml/item1.xml><?xml version="1.0" encoding="utf-8"?>
-<?mso-contentType ?>
-<FormTemplates xmlns="http://schemas.microsoft.com/sharepoint/v3/contenttype/forms">
-  <Display>DocumentLibraryForm</Display>
-  <Edit>DocumentLibraryForm</Edit>
-  <New>DocumentLibraryForm</New>
-</FormTemplates>
-</file>
-
-<file path=customXml/item2.xml><?xml version="1.0" encoding="utf-8"?>
-<p:properties xmlns:p="http://schemas.microsoft.com/office/2006/metadata/properties" xmlns:xsi="http://www.w3.org/2001/XMLSchema-instance" xmlns:pc="http://schemas.microsoft.com/office/infopath/2007/PartnerControls">
-  <documentManagement/>
-</p:properties>
-</file>
-
-<file path=customXml/item3.xml><?xml version="1.0" encoding="utf-8"?>
 <ct:contentTypeSchema xmlns:ct="http://schemas.microsoft.com/office/2006/metadata/contentType" xmlns:ma="http://schemas.microsoft.com/office/2006/metadata/properties/metaAttributes" ct:_="" ma:_="" ma:contentTypeName="Document" ma:contentTypeID="0x010100CA53E45184BAE24091CC038DE5589C70" ma:contentTypeVersion="13" ma:contentTypeDescription="Een nieuw document maken." ma:contentTypeScope="" ma:versionID="51e52146d5e41f5e409cd0d2f2cb7670">
   <xsd:schema xmlns:xsd="http://www.w3.org/2001/XMLSchema" xmlns:xs="http://www.w3.org/2001/XMLSchema" xmlns:p="http://schemas.microsoft.com/office/2006/metadata/properties" xmlns:ns2="1f55d0c4-05aa-4c2b-a57a-4eab3d02d34b" xmlns:ns3="b3eb6833-ff68-4673-b07f-ad406614af1d" targetNamespace="http://schemas.microsoft.com/office/2006/metadata/properties" ma:root="true" ma:fieldsID="d1695e23627906da0dbf9bfeff99aa39" ns2:_="" ns3:_="">
     <xsd:import namespace="1f55d0c4-05aa-4c2b-a57a-4eab3d02d34b"/>
@@ -5787,10 +5904,36 @@
 </ct:contentTypeSchema>
 </file>
 
+<file path=customXml/item2.xml><?xml version="1.0" encoding="utf-8"?>
+<p:properties xmlns:p="http://schemas.microsoft.com/office/2006/metadata/properties" xmlns:xsi="http://www.w3.org/2001/XMLSchema-instance" xmlns:pc="http://schemas.microsoft.com/office/infopath/2007/PartnerControls">
+  <documentManagement/>
+</p:properties>
+</file>
+
+<file path=customXml/item3.xml><?xml version="1.0" encoding="utf-8"?>
+<?mso-contentType ?>
+<FormTemplates xmlns="http://schemas.microsoft.com/sharepoint/v3/contenttype/forms">
+  <Display>DocumentLibraryForm</Display>
+  <Edit>DocumentLibraryForm</Edit>
+  <New>DocumentLibraryForm</New>
+</FormTemplates>
+</file>
+
 <file path=customXml/itemProps1.xml><?xml version="1.0" encoding="utf-8"?>
-<ds:datastoreItem xmlns:ds="http://schemas.openxmlformats.org/officeDocument/2006/customXml" ds:itemID="{2CCCBAFB-3F28-4180-989B-026E0CDE5E31}">
+<ds:datastoreItem xmlns:ds="http://schemas.openxmlformats.org/officeDocument/2006/customXml" ds:itemID="{5A05B009-6AA1-4FD0-9AEA-EF092A6040CA}">
   <ds:schemaRefs>
-    <ds:schemaRef ds:uri="http://schemas.microsoft.com/sharepoint/v3/contenttype/forms"/>
+    <ds:schemaRef ds:uri="http://schemas.microsoft.com/office/2006/metadata/contentType"/>
+    <ds:schemaRef ds:uri="http://schemas.microsoft.com/office/2006/metadata/properties/metaAttributes"/>
+    <ds:schemaRef ds:uri="http://www.w3.org/2001/XMLSchema"/>
+    <ds:schemaRef ds:uri="http://schemas.microsoft.com/office/2006/metadata/properties"/>
+    <ds:schemaRef ds:uri="1f55d0c4-05aa-4c2b-a57a-4eab3d02d34b"/>
+    <ds:schemaRef ds:uri="b3eb6833-ff68-4673-b07f-ad406614af1d"/>
+    <ds:schemaRef ds:uri="http://schemas.microsoft.com/office/2006/documentManagement/types"/>
+    <ds:schemaRef ds:uri="http://schemas.microsoft.com/office/infopath/2007/PartnerControls"/>
+    <ds:schemaRef ds:uri="http://schemas.openxmlformats.org/package/2006/metadata/core-properties"/>
+    <ds:schemaRef ds:uri="http://purl.org/dc/elements/1.1/"/>
+    <ds:schemaRef ds:uri="http://purl.org/dc/terms/"/>
+    <ds:schemaRef ds:uri="http://schemas.microsoft.com/internal/obd"/>
   </ds:schemaRefs>
 </ds:datastoreItem>
 </file>
@@ -5813,20 +5956,9 @@
 </file>
 
 <file path=customXml/itemProps3.xml><?xml version="1.0" encoding="utf-8"?>
-<ds:datastoreItem xmlns:ds="http://schemas.openxmlformats.org/officeDocument/2006/customXml" ds:itemID="{5A05B009-6AA1-4FD0-9AEA-EF092A6040CA}">
+<ds:datastoreItem xmlns:ds="http://schemas.openxmlformats.org/officeDocument/2006/customXml" ds:itemID="{2CCCBAFB-3F28-4180-989B-026E0CDE5E31}">
   <ds:schemaRefs>
-    <ds:schemaRef ds:uri="http://schemas.microsoft.com/office/2006/metadata/contentType"/>
-    <ds:schemaRef ds:uri="http://schemas.microsoft.com/office/2006/metadata/properties/metaAttributes"/>
-    <ds:schemaRef ds:uri="http://www.w3.org/2001/XMLSchema"/>
-    <ds:schemaRef ds:uri="http://schemas.microsoft.com/office/2006/metadata/properties"/>
-    <ds:schemaRef ds:uri="1f55d0c4-05aa-4c2b-a57a-4eab3d02d34b"/>
-    <ds:schemaRef ds:uri="b3eb6833-ff68-4673-b07f-ad406614af1d"/>
-    <ds:schemaRef ds:uri="http://schemas.microsoft.com/office/2006/documentManagement/types"/>
-    <ds:schemaRef ds:uri="http://schemas.microsoft.com/office/infopath/2007/PartnerControls"/>
-    <ds:schemaRef ds:uri="http://schemas.openxmlformats.org/package/2006/metadata/core-properties"/>
-    <ds:schemaRef ds:uri="http://purl.org/dc/elements/1.1/"/>
-    <ds:schemaRef ds:uri="http://purl.org/dc/terms/"/>
-    <ds:schemaRef ds:uri="http://schemas.microsoft.com/internal/obd"/>
+    <ds:schemaRef ds:uri="http://schemas.microsoft.com/sharepoint/v3/contenttype/forms"/>
   </ds:schemaRefs>
 </ds:datastoreItem>
 </file>
</xml_diff>

<commit_message>
Add announcement slide to exported pptx.
</commit_message>
<xml_diff>
--- a/DeBron.PowerPoint.Builder/DeBron.PowerPoint.Builder/template.pptx
+++ b/DeBron.PowerPoint.Builder/DeBron.PowerPoint.Builder/template.pptx
@@ -1,16 +1,16 @@
 
 <file path=ppt/presentation.xml><?xml version="1.0" encoding="utf-8"?>
-<p:presentation xmlns:p15="http://schemas.microsoft.com/office/powerpoint/2012/main" xmlns:a="http://schemas.openxmlformats.org/drawingml/2006/main" xmlns:r="http://schemas.openxmlformats.org/officeDocument/2006/relationships" xmlns:p="http://schemas.openxmlformats.org/presentationml/2006/main" saveSubsetFonts="1" autoCompressPictures="0">
+<p:presentation xmlns:a="http://schemas.openxmlformats.org/drawingml/2006/main" xmlns:r="http://schemas.openxmlformats.org/officeDocument/2006/relationships" xmlns:p="http://schemas.openxmlformats.org/presentationml/2006/main" saveSubsetFonts="1" autoCompressPictures="0">
   <p:sldMasterIdLst>
     <p:sldMasterId id="2147483660" r:id="rId4"/>
+    <p:sldMasterId id="2147483682" r:id="rId5"/>
   </p:sldMasterIdLst>
   <p:notesMasterIdLst>
-    <p:notesMasterId r:id="rId6"/>
+    <p:notesMasterId r:id="rId8"/>
   </p:notesMasterIdLst>
   <p:sldIdLst>
-    <p:sldId id="3196" r:id="rId5"/>
-    <p:sldId id="3197" r:id="Rec6ca14c14ae4c7e"/>
-    <p:sldId id="3198" r:id="R3bc6e16e80fe4f14"/>
+    <p:sldId id="350" r:id="rId6"/>
+    <p:sldId id="3196" r:id="rId7"/>
   </p:sldIdLst>
   <p:sldSz cx="12192000" cy="6858000"/>
   <p:notesSz cx="6858000" cy="9144000"/>
@@ -2659,7 +2659,7 @@
           <a:p>
             <a:fld id="{2DC0BB24-8F05-8E4F-8EF0-B18B6E22EC56}" type="datetimeFigureOut">
               <a:rPr lang="en-NL" smtClean="0"/>
-              <a:t>05/22/2025</a:t>
+              <a:t>05/25/2025</a:t>
             </a:fld>
             <a:endParaRPr lang="en-NL"/>
           </a:p>
@@ -2971,6 +2971,1437 @@
 </p:sldLayout>
 </file>
 
+<file path=ppt/slideLayouts/slideLayout10.xml><?xml version="1.0" encoding="utf-8"?>
+<p:sldLayout xmlns:a="http://schemas.openxmlformats.org/drawingml/2006/main" xmlns:r="http://schemas.openxmlformats.org/officeDocument/2006/relationships" xmlns:p="http://schemas.openxmlformats.org/presentationml/2006/main" preserve="1" userDrawn="1">
+  <p:cSld name="welkom">
+    <p:bg>
+      <p:bgPr>
+        <a:blipFill dpi="0" rotWithShape="1">
+          <a:blip r:embed="rId2">
+            <a:lum/>
+          </a:blip>
+          <a:srcRect/>
+          <a:stretch>
+            <a:fillRect/>
+          </a:stretch>
+        </a:blipFill>
+        <a:effectLst/>
+      </p:bgPr>
+    </p:bg>
+    <p:spTree>
+      <p:nvGrpSpPr>
+        <p:cNvPr id="1" name=""/>
+        <p:cNvGrpSpPr/>
+        <p:nvPr/>
+      </p:nvGrpSpPr>
+      <p:grpSpPr>
+        <a:xfrm>
+          <a:off x="0" y="0"/>
+          <a:ext cx="0" cy="0"/>
+          <a:chOff x="0" y="0"/>
+          <a:chExt cx="0" cy="0"/>
+        </a:xfrm>
+      </p:grpSpPr>
+    </p:spTree>
+    <p:extLst>
+      <p:ext uri="{BB962C8B-B14F-4D97-AF65-F5344CB8AC3E}">
+        <p14:creationId xmlns:p14="http://schemas.microsoft.com/office/powerpoint/2010/main" val="1931701905"/>
+      </p:ext>
+    </p:extLst>
+  </p:cSld>
+  <p:clrMapOvr>
+    <a:masterClrMapping/>
+  </p:clrMapOvr>
+</p:sldLayout>
+</file>
+
+<file path=ppt/slideLayouts/slideLayout11.xml><?xml version="1.0" encoding="utf-8"?>
+<p:sldLayout xmlns:a="http://schemas.openxmlformats.org/drawingml/2006/main" xmlns:r="http://schemas.openxmlformats.org/officeDocument/2006/relationships" xmlns:p="http://schemas.openxmlformats.org/presentationml/2006/main" preserve="1" userDrawn="1">
+  <p:cSld name="mededeling tijdens welkom">
+    <p:bg>
+      <p:bgPr>
+        <a:blipFill dpi="0" rotWithShape="1">
+          <a:blip r:embed="rId2">
+            <a:lum/>
+          </a:blip>
+          <a:srcRect/>
+          <a:stretch>
+            <a:fillRect/>
+          </a:stretch>
+        </a:blipFill>
+        <a:effectLst/>
+      </p:bgPr>
+    </p:bg>
+    <p:spTree>
+      <p:nvGrpSpPr>
+        <p:cNvPr id="1" name=""/>
+        <p:cNvGrpSpPr/>
+        <p:nvPr/>
+      </p:nvGrpSpPr>
+      <p:grpSpPr>
+        <a:xfrm>
+          <a:off x="0" y="0"/>
+          <a:ext cx="0" cy="0"/>
+          <a:chOff x="0" y="0"/>
+          <a:chExt cx="0" cy="0"/>
+        </a:xfrm>
+      </p:grpSpPr>
+    </p:spTree>
+    <p:extLst>
+      <p:ext uri="{BB962C8B-B14F-4D97-AF65-F5344CB8AC3E}">
+        <p14:creationId xmlns:p14="http://schemas.microsoft.com/office/powerpoint/2010/main" val="957112388"/>
+      </p:ext>
+    </p:extLst>
+  </p:cSld>
+  <p:clrMapOvr>
+    <a:masterClrMapping/>
+  </p:clrMapOvr>
+</p:sldLayout>
+</file>
+
+<file path=ppt/slideLayouts/slideLayout12.xml><?xml version="1.0" encoding="utf-8"?>
+<p:sldLayout xmlns:a="http://schemas.openxmlformats.org/drawingml/2006/main" xmlns:r="http://schemas.openxmlformats.org/officeDocument/2006/relationships" xmlns:p="http://schemas.openxmlformats.org/presentationml/2006/main" preserve="1" userDrawn="1">
+  <p:cSld name="programma (met thema)">
+    <p:bg>
+      <p:bgPr>
+        <a:blipFill dpi="0" rotWithShape="1">
+          <a:blip r:embed="rId2">
+            <a:lum/>
+          </a:blip>
+          <a:srcRect/>
+          <a:stretch>
+            <a:fillRect/>
+          </a:stretch>
+        </a:blipFill>
+        <a:effectLst/>
+      </p:bgPr>
+    </p:bg>
+    <p:spTree>
+      <p:nvGrpSpPr>
+        <p:cNvPr id="1" name=""/>
+        <p:cNvGrpSpPr/>
+        <p:nvPr/>
+      </p:nvGrpSpPr>
+      <p:grpSpPr>
+        <a:xfrm>
+          <a:off x="0" y="0"/>
+          <a:ext cx="0" cy="0"/>
+          <a:chOff x="0" y="0"/>
+          <a:chExt cx="0" cy="0"/>
+        </a:xfrm>
+      </p:grpSpPr>
+      <p:sp>
+        <p:nvSpPr>
+          <p:cNvPr id="2" name="Tekstvak 1">
+            <a:extLst>
+              <a:ext uri="{FF2B5EF4-FFF2-40B4-BE49-F238E27FC236}">
+                <a16:creationId xmlns:a16="http://schemas.microsoft.com/office/drawing/2014/main" id="{2ADC5EA7-414F-904D-90DC-F8C8D09D64CE}"/>
+              </a:ext>
+            </a:extLst>
+          </p:cNvPr>
+          <p:cNvSpPr txBox="1">
+            <a:spLocks noChangeArrowheads="1"/>
+          </p:cNvSpPr>
+          <p:nvPr userDrawn="1"/>
+        </p:nvSpPr>
+        <p:spPr bwMode="auto">
+          <a:xfrm>
+            <a:off x="1271571" y="453249"/>
+            <a:ext cx="6429375" cy="4444999"/>
+          </a:xfrm>
+          <a:prstGeom prst="rect">
+            <a:avLst/>
+          </a:prstGeom>
+          <a:noFill/>
+          <a:ln>
+            <a:noFill/>
+          </a:ln>
+          <a:extLst>
+            <a:ext uri="{909E8E84-426E-40dd-AFC4-6F175D3DCCD1}">
+              <a14:hiddenFill xmlns="" xmlns:a14="http://schemas.microsoft.com/office/drawing/2010/main">
+                <a:solidFill>
+                  <a:srgbClr val="FFFFFF"/>
+                </a:solidFill>
+              </a14:hiddenFill>
+            </a:ext>
+            <a:ext uri="{91240B29-F687-4f45-9708-019B960494DF}">
+              <a14:hiddenLine xmlns="" xmlns:a14="http://schemas.microsoft.com/office/drawing/2010/main" w="9525">
+                <a:solidFill>
+                  <a:srgbClr val="000000"/>
+                </a:solidFill>
+                <a:miter lim="800000"/>
+                <a:headEnd/>
+                <a:tailEnd/>
+              </a14:hiddenLine>
+            </a:ext>
+          </a:extLst>
+        </p:spPr>
+        <p:txBody>
+          <a:bodyPr>
+            <a:spAutoFit/>
+          </a:bodyPr>
+          <a:lstStyle>
+            <a:lvl1pPr marL="342900" indent="-342900" eaLnBrk="0" hangingPunct="0">
+              <a:tabLst>
+                <a:tab pos="1878013" algn="l"/>
+              </a:tabLst>
+              <a:defRPr sz="5600">
+                <a:solidFill>
+                  <a:srgbClr val="000000"/>
+                </a:solidFill>
+                <a:latin typeface="Gill Sans" charset="0"/>
+                <a:ea typeface="ヒラギノ角ゴ ProN W3" charset="0"/>
+                <a:cs typeface="ヒラギノ角ゴ ProN W3" charset="0"/>
+                <a:sym typeface="Gill Sans" charset="0"/>
+              </a:defRPr>
+            </a:lvl1pPr>
+            <a:lvl2pPr marL="742950" indent="-285750" eaLnBrk="0" hangingPunct="0">
+              <a:tabLst>
+                <a:tab pos="1878013" algn="l"/>
+              </a:tabLst>
+              <a:defRPr sz="5600">
+                <a:solidFill>
+                  <a:srgbClr val="000000"/>
+                </a:solidFill>
+                <a:latin typeface="Gill Sans" charset="0"/>
+                <a:ea typeface="ヒラギノ角ゴ ProN W3" charset="0"/>
+                <a:cs typeface="ヒラギノ角ゴ ProN W3" charset="0"/>
+                <a:sym typeface="Gill Sans" charset="0"/>
+              </a:defRPr>
+            </a:lvl2pPr>
+            <a:lvl3pPr marL="1143000" indent="-228600" eaLnBrk="0" hangingPunct="0">
+              <a:tabLst>
+                <a:tab pos="1878013" algn="l"/>
+              </a:tabLst>
+              <a:defRPr sz="5600">
+                <a:solidFill>
+                  <a:srgbClr val="000000"/>
+                </a:solidFill>
+                <a:latin typeface="Gill Sans" charset="0"/>
+                <a:ea typeface="ヒラギノ角ゴ ProN W3" charset="0"/>
+                <a:cs typeface="ヒラギノ角ゴ ProN W3" charset="0"/>
+                <a:sym typeface="Gill Sans" charset="0"/>
+              </a:defRPr>
+            </a:lvl3pPr>
+            <a:lvl4pPr marL="1600200" indent="-228600" eaLnBrk="0" hangingPunct="0">
+              <a:tabLst>
+                <a:tab pos="1878013" algn="l"/>
+              </a:tabLst>
+              <a:defRPr sz="5600">
+                <a:solidFill>
+                  <a:srgbClr val="000000"/>
+                </a:solidFill>
+                <a:latin typeface="Gill Sans" charset="0"/>
+                <a:ea typeface="ヒラギノ角ゴ ProN W3" charset="0"/>
+                <a:cs typeface="ヒラギノ角ゴ ProN W3" charset="0"/>
+                <a:sym typeface="Gill Sans" charset="0"/>
+              </a:defRPr>
+            </a:lvl4pPr>
+            <a:lvl5pPr marL="2057400" indent="-228600" eaLnBrk="0" hangingPunct="0">
+              <a:tabLst>
+                <a:tab pos="1878013" algn="l"/>
+              </a:tabLst>
+              <a:defRPr sz="5600">
+                <a:solidFill>
+                  <a:srgbClr val="000000"/>
+                </a:solidFill>
+                <a:latin typeface="Gill Sans" charset="0"/>
+                <a:ea typeface="ヒラギノ角ゴ ProN W3" charset="0"/>
+                <a:cs typeface="ヒラギノ角ゴ ProN W3" charset="0"/>
+                <a:sym typeface="Gill Sans" charset="0"/>
+              </a:defRPr>
+            </a:lvl5pPr>
+            <a:lvl6pPr marL="2514600" indent="-228600" algn="ctr" eaLnBrk="0" fontAlgn="base" hangingPunct="0">
+              <a:spcBef>
+                <a:spcPct val="0"/>
+              </a:spcBef>
+              <a:spcAft>
+                <a:spcPct val="0"/>
+              </a:spcAft>
+              <a:tabLst>
+                <a:tab pos="1878013" algn="l"/>
+              </a:tabLst>
+              <a:defRPr sz="5600">
+                <a:solidFill>
+                  <a:srgbClr val="000000"/>
+                </a:solidFill>
+                <a:latin typeface="Gill Sans" charset="0"/>
+                <a:ea typeface="ヒラギノ角ゴ ProN W3" charset="0"/>
+                <a:cs typeface="ヒラギノ角ゴ ProN W3" charset="0"/>
+                <a:sym typeface="Gill Sans" charset="0"/>
+              </a:defRPr>
+            </a:lvl6pPr>
+            <a:lvl7pPr marL="2971800" indent="-228600" algn="ctr" eaLnBrk="0" fontAlgn="base" hangingPunct="0">
+              <a:spcBef>
+                <a:spcPct val="0"/>
+              </a:spcBef>
+              <a:spcAft>
+                <a:spcPct val="0"/>
+              </a:spcAft>
+              <a:tabLst>
+                <a:tab pos="1878013" algn="l"/>
+              </a:tabLst>
+              <a:defRPr sz="5600">
+                <a:solidFill>
+                  <a:srgbClr val="000000"/>
+                </a:solidFill>
+                <a:latin typeface="Gill Sans" charset="0"/>
+                <a:ea typeface="ヒラギノ角ゴ ProN W3" charset="0"/>
+                <a:cs typeface="ヒラギノ角ゴ ProN W3" charset="0"/>
+                <a:sym typeface="Gill Sans" charset="0"/>
+              </a:defRPr>
+            </a:lvl7pPr>
+            <a:lvl8pPr marL="3429000" indent="-228600" algn="ctr" eaLnBrk="0" fontAlgn="base" hangingPunct="0">
+              <a:spcBef>
+                <a:spcPct val="0"/>
+              </a:spcBef>
+              <a:spcAft>
+                <a:spcPct val="0"/>
+              </a:spcAft>
+              <a:tabLst>
+                <a:tab pos="1878013" algn="l"/>
+              </a:tabLst>
+              <a:defRPr sz="5600">
+                <a:solidFill>
+                  <a:srgbClr val="000000"/>
+                </a:solidFill>
+                <a:latin typeface="Gill Sans" charset="0"/>
+                <a:ea typeface="ヒラギノ角ゴ ProN W3" charset="0"/>
+                <a:cs typeface="ヒラギノ角ゴ ProN W3" charset="0"/>
+                <a:sym typeface="Gill Sans" charset="0"/>
+              </a:defRPr>
+            </a:lvl8pPr>
+            <a:lvl9pPr marL="3886200" indent="-228600" algn="ctr" eaLnBrk="0" fontAlgn="base" hangingPunct="0">
+              <a:spcBef>
+                <a:spcPct val="0"/>
+              </a:spcBef>
+              <a:spcAft>
+                <a:spcPct val="0"/>
+              </a:spcAft>
+              <a:tabLst>
+                <a:tab pos="1878013" algn="l"/>
+              </a:tabLst>
+              <a:defRPr sz="5600">
+                <a:solidFill>
+                  <a:srgbClr val="000000"/>
+                </a:solidFill>
+                <a:latin typeface="Gill Sans" charset="0"/>
+                <a:ea typeface="ヒラギノ角ゴ ProN W3" charset="0"/>
+                <a:cs typeface="ヒラギノ角ゴ ProN W3" charset="0"/>
+                <a:sym typeface="Gill Sans" charset="0"/>
+              </a:defRPr>
+            </a:lvl9pPr>
+          </a:lstStyle>
+          <a:p>
+            <a:pPr>
+              <a:lnSpc>
+                <a:spcPct val="130000"/>
+              </a:lnSpc>
+            </a:pPr>
+            <a:r>
+              <a:rPr lang="nl-NL" sz="2200" b="1" dirty="0">
+                <a:solidFill>
+                  <a:schemeClr val="bg1"/>
+                </a:solidFill>
+                <a:effectLst>
+                  <a:outerShdw blurRad="38100" dist="38100" dir="2700000" algn="tl">
+                    <a:srgbClr val="000000">
+                      <a:alpha val="43137"/>
+                    </a:srgbClr>
+                  </a:outerShdw>
+                </a:effectLst>
+                <a:latin typeface="Century Gothic"/>
+                <a:cs typeface="Century Gothic"/>
+              </a:rPr>
+              <a:t>Welkom &amp; mededelingen</a:t>
+            </a:r>
+          </a:p>
+          <a:p>
+            <a:pPr lvl="0">
+              <a:lnSpc>
+                <a:spcPct val="130000"/>
+              </a:lnSpc>
+            </a:pPr>
+            <a:r>
+              <a:rPr lang="nl-NL" sz="2200" b="1" dirty="0">
+                <a:solidFill>
+                  <a:schemeClr val="bg1"/>
+                </a:solidFill>
+                <a:effectLst>
+                  <a:outerShdw blurRad="38100" dist="38100" dir="2700000" algn="tl">
+                    <a:srgbClr val="000000">
+                      <a:alpha val="43137"/>
+                    </a:srgbClr>
+                  </a:outerShdw>
+                </a:effectLst>
+                <a:latin typeface="Century Gothic"/>
+                <a:cs typeface="Century Gothic"/>
+              </a:rPr>
+              <a:t>Woord van vertrouwen &amp; groet</a:t>
+            </a:r>
+          </a:p>
+          <a:p>
+            <a:pPr lvl="0">
+              <a:lnSpc>
+                <a:spcPct val="130000"/>
+              </a:lnSpc>
+            </a:pPr>
+            <a:r>
+              <a:rPr lang="nl-NL" sz="2200" b="1" dirty="0">
+                <a:solidFill>
+                  <a:schemeClr val="bg1"/>
+                </a:solidFill>
+                <a:effectLst>
+                  <a:outerShdw blurRad="38100" dist="38100" dir="2700000" algn="tl">
+                    <a:srgbClr val="000000">
+                      <a:alpha val="43137"/>
+                    </a:srgbClr>
+                  </a:outerShdw>
+                </a:effectLst>
+                <a:latin typeface="Century Gothic"/>
+                <a:cs typeface="Century Gothic"/>
+              </a:rPr>
+              <a:t>Opwekking 176</a:t>
+            </a:r>
+          </a:p>
+          <a:p>
+            <a:pPr lvl="0">
+              <a:lnSpc>
+                <a:spcPct val="130000"/>
+              </a:lnSpc>
+            </a:pPr>
+            <a:r>
+              <a:rPr lang="nl-NL" sz="2200" b="1" dirty="0">
+                <a:solidFill>
+                  <a:schemeClr val="bg1"/>
+                </a:solidFill>
+                <a:effectLst>
+                  <a:outerShdw blurRad="38100" dist="38100" dir="2700000" algn="tl">
+                    <a:srgbClr val="000000">
+                      <a:alpha val="43137"/>
+                    </a:srgbClr>
+                  </a:outerShdw>
+                </a:effectLst>
+                <a:latin typeface="Century Gothic"/>
+                <a:cs typeface="Century Gothic"/>
+              </a:rPr>
+              <a:t>Opwekking 706</a:t>
+            </a:r>
+          </a:p>
+          <a:p>
+            <a:pPr lvl="0">
+              <a:lnSpc>
+                <a:spcPct val="130000"/>
+              </a:lnSpc>
+            </a:pPr>
+            <a:r>
+              <a:rPr lang="nl-NL" sz="2200" b="1" dirty="0">
+                <a:solidFill>
+                  <a:schemeClr val="bg1"/>
+                </a:solidFill>
+                <a:effectLst>
+                  <a:outerShdw blurRad="38100" dist="38100" dir="2700000" algn="tl">
+                    <a:srgbClr val="000000">
+                      <a:alpha val="43137"/>
+                    </a:srgbClr>
+                  </a:outerShdw>
+                </a:effectLst>
+                <a:latin typeface="Century Gothic"/>
+                <a:cs typeface="Century Gothic"/>
+              </a:rPr>
+              <a:t>Gebed</a:t>
+            </a:r>
+          </a:p>
+          <a:p>
+            <a:pPr lvl="0">
+              <a:lnSpc>
+                <a:spcPct val="130000"/>
+              </a:lnSpc>
+            </a:pPr>
+            <a:r>
+              <a:rPr lang="nl-NL" sz="2200" b="1" dirty="0">
+                <a:solidFill>
+                  <a:schemeClr val="bg1"/>
+                </a:solidFill>
+                <a:effectLst>
+                  <a:outerShdw blurRad="38100" dist="38100" dir="2700000" algn="tl">
+                    <a:srgbClr val="000000">
+                      <a:alpha val="43137"/>
+                    </a:srgbClr>
+                  </a:outerShdw>
+                </a:effectLst>
+                <a:latin typeface="Century Gothic"/>
+                <a:cs typeface="Century Gothic"/>
+              </a:rPr>
+              <a:t>Doopformulier</a:t>
+            </a:r>
+          </a:p>
+          <a:p>
+            <a:pPr lvl="0">
+              <a:lnSpc>
+                <a:spcPct val="130000"/>
+              </a:lnSpc>
+            </a:pPr>
+            <a:r>
+              <a:rPr lang="nl-NL" sz="2200" b="1" dirty="0">
+                <a:solidFill>
+                  <a:schemeClr val="bg1"/>
+                </a:solidFill>
+                <a:effectLst>
+                  <a:outerShdw blurRad="38100" dist="38100" dir="2700000" algn="tl">
+                    <a:srgbClr val="000000">
+                      <a:alpha val="43137"/>
+                    </a:srgbClr>
+                  </a:outerShdw>
+                </a:effectLst>
+                <a:latin typeface="Century Gothic"/>
+                <a:cs typeface="Century Gothic"/>
+              </a:rPr>
+              <a:t>Getuigenis</a:t>
+            </a:r>
+          </a:p>
+          <a:p>
+            <a:pPr lvl="0">
+              <a:lnSpc>
+                <a:spcPct val="130000"/>
+              </a:lnSpc>
+            </a:pPr>
+            <a:r>
+              <a:rPr lang="nl-NL" sz="2200" b="1" dirty="0" err="1">
+                <a:solidFill>
+                  <a:schemeClr val="bg1"/>
+                </a:solidFill>
+                <a:effectLst>
+                  <a:outerShdw blurRad="38100" dist="38100" dir="2700000" algn="tl">
+                    <a:srgbClr val="000000">
+                      <a:alpha val="43137"/>
+                    </a:srgbClr>
+                  </a:outerShdw>
+                </a:effectLst>
+                <a:latin typeface="Century Gothic"/>
+                <a:cs typeface="Century Gothic"/>
+              </a:rPr>
+              <a:t>Holy</a:t>
+            </a:r>
+            <a:r>
+              <a:rPr lang="nl-NL" sz="2200" b="1" dirty="0">
+                <a:solidFill>
+                  <a:schemeClr val="bg1"/>
+                </a:solidFill>
+                <a:effectLst>
+                  <a:outerShdw blurRad="38100" dist="38100" dir="2700000" algn="tl">
+                    <a:srgbClr val="000000">
+                      <a:alpha val="43137"/>
+                    </a:srgbClr>
+                  </a:outerShdw>
+                </a:effectLst>
+                <a:latin typeface="Century Gothic"/>
+                <a:cs typeface="Century Gothic"/>
+              </a:rPr>
+              <a:t> </a:t>
+            </a:r>
+            <a:r>
+              <a:rPr lang="nl-NL" sz="2200" b="1" dirty="0" err="1">
+                <a:solidFill>
+                  <a:schemeClr val="bg1"/>
+                </a:solidFill>
+                <a:effectLst>
+                  <a:outerShdw blurRad="38100" dist="38100" dir="2700000" algn="tl">
+                    <a:srgbClr val="000000">
+                      <a:alpha val="43137"/>
+                    </a:srgbClr>
+                  </a:outerShdw>
+                </a:effectLst>
+                <a:latin typeface="Century Gothic"/>
+                <a:cs typeface="Century Gothic"/>
+              </a:rPr>
+              <a:t>Forever</a:t>
+            </a:r>
+            <a:endParaRPr lang="nl-NL" sz="2200" b="1" dirty="0">
+              <a:solidFill>
+                <a:schemeClr val="bg1"/>
+              </a:solidFill>
+              <a:effectLst>
+                <a:outerShdw blurRad="38100" dist="38100" dir="2700000" algn="tl">
+                  <a:srgbClr val="000000">
+                    <a:alpha val="43137"/>
+                  </a:srgbClr>
+                </a:outerShdw>
+              </a:effectLst>
+              <a:latin typeface="Century Gothic"/>
+              <a:cs typeface="Century Gothic"/>
+            </a:endParaRPr>
+          </a:p>
+          <a:p>
+            <a:pPr lvl="0">
+              <a:lnSpc>
+                <a:spcPct val="130000"/>
+              </a:lnSpc>
+            </a:pPr>
+            <a:r>
+              <a:rPr lang="nl-NL" sz="2200" b="1" dirty="0">
+                <a:solidFill>
+                  <a:schemeClr val="bg1"/>
+                </a:solidFill>
+                <a:effectLst>
+                  <a:outerShdw blurRad="38100" dist="38100" dir="2700000" algn="tl">
+                    <a:srgbClr val="000000">
+                      <a:alpha val="43137"/>
+                    </a:srgbClr>
+                  </a:outerShdw>
+                </a:effectLst>
+                <a:latin typeface="Century Gothic"/>
+                <a:cs typeface="Century Gothic"/>
+              </a:rPr>
+              <a:t>Doop</a:t>
+            </a:r>
+          </a:p>
+          <a:p>
+            <a:pPr lvl="0">
+              <a:lnSpc>
+                <a:spcPct val="130000"/>
+              </a:lnSpc>
+            </a:pPr>
+            <a:r>
+              <a:rPr lang="nl-NL" sz="2200" b="1" dirty="0">
+                <a:solidFill>
+                  <a:schemeClr val="bg1"/>
+                </a:solidFill>
+                <a:effectLst>
+                  <a:outerShdw blurRad="38100" dist="38100" dir="2700000" algn="tl">
+                    <a:srgbClr val="000000">
+                      <a:alpha val="43137"/>
+                    </a:srgbClr>
+                  </a:outerShdw>
+                </a:effectLst>
+                <a:latin typeface="Century Gothic"/>
+                <a:cs typeface="Century Gothic"/>
+              </a:rPr>
+              <a:t>Opwekking 642</a:t>
+            </a:r>
+          </a:p>
+        </p:txBody>
+      </p:sp>
+      <p:sp>
+        <p:nvSpPr>
+          <p:cNvPr id="3" name="Tekstvak 2">
+            <a:extLst>
+              <a:ext uri="{FF2B5EF4-FFF2-40B4-BE49-F238E27FC236}">
+                <a16:creationId xmlns:a16="http://schemas.microsoft.com/office/drawing/2014/main" id="{B267CFCA-2A59-E64E-B4A3-1DEDB1937932}"/>
+              </a:ext>
+            </a:extLst>
+          </p:cNvPr>
+          <p:cNvSpPr txBox="1">
+            <a:spLocks noChangeArrowheads="1"/>
+          </p:cNvSpPr>
+          <p:nvPr userDrawn="1"/>
+        </p:nvSpPr>
+        <p:spPr bwMode="auto">
+          <a:xfrm>
+            <a:off x="6535069" y="453249"/>
+            <a:ext cx="6429375" cy="4885120"/>
+          </a:xfrm>
+          <a:prstGeom prst="rect">
+            <a:avLst/>
+          </a:prstGeom>
+          <a:noFill/>
+          <a:ln>
+            <a:noFill/>
+          </a:ln>
+          <a:extLst>
+            <a:ext uri="{909E8E84-426E-40dd-AFC4-6F175D3DCCD1}">
+              <a14:hiddenFill xmlns="" xmlns:a14="http://schemas.microsoft.com/office/drawing/2010/main">
+                <a:solidFill>
+                  <a:srgbClr val="FFFFFF"/>
+                </a:solidFill>
+              </a14:hiddenFill>
+            </a:ext>
+            <a:ext uri="{91240B29-F687-4f45-9708-019B960494DF}">
+              <a14:hiddenLine xmlns="" xmlns:a14="http://schemas.microsoft.com/office/drawing/2010/main" w="9525">
+                <a:solidFill>
+                  <a:srgbClr val="000000"/>
+                </a:solidFill>
+                <a:miter lim="800000"/>
+                <a:headEnd/>
+                <a:tailEnd/>
+              </a14:hiddenLine>
+            </a:ext>
+          </a:extLst>
+        </p:spPr>
+        <p:txBody>
+          <a:bodyPr>
+            <a:spAutoFit/>
+          </a:bodyPr>
+          <a:lstStyle>
+            <a:lvl1pPr marL="342900" indent="-342900" eaLnBrk="0" hangingPunct="0">
+              <a:tabLst>
+                <a:tab pos="1878013" algn="l"/>
+              </a:tabLst>
+              <a:defRPr sz="5600">
+                <a:solidFill>
+                  <a:srgbClr val="000000"/>
+                </a:solidFill>
+                <a:latin typeface="Gill Sans" charset="0"/>
+                <a:ea typeface="ヒラギノ角ゴ ProN W3" charset="0"/>
+                <a:cs typeface="ヒラギノ角ゴ ProN W3" charset="0"/>
+                <a:sym typeface="Gill Sans" charset="0"/>
+              </a:defRPr>
+            </a:lvl1pPr>
+            <a:lvl2pPr marL="742950" indent="-285750" eaLnBrk="0" hangingPunct="0">
+              <a:tabLst>
+                <a:tab pos="1878013" algn="l"/>
+              </a:tabLst>
+              <a:defRPr sz="5600">
+                <a:solidFill>
+                  <a:srgbClr val="000000"/>
+                </a:solidFill>
+                <a:latin typeface="Gill Sans" charset="0"/>
+                <a:ea typeface="ヒラギノ角ゴ ProN W3" charset="0"/>
+                <a:cs typeface="ヒラギノ角ゴ ProN W3" charset="0"/>
+                <a:sym typeface="Gill Sans" charset="0"/>
+              </a:defRPr>
+            </a:lvl2pPr>
+            <a:lvl3pPr marL="1143000" indent="-228600" eaLnBrk="0" hangingPunct="0">
+              <a:tabLst>
+                <a:tab pos="1878013" algn="l"/>
+              </a:tabLst>
+              <a:defRPr sz="5600">
+                <a:solidFill>
+                  <a:srgbClr val="000000"/>
+                </a:solidFill>
+                <a:latin typeface="Gill Sans" charset="0"/>
+                <a:ea typeface="ヒラギノ角ゴ ProN W3" charset="0"/>
+                <a:cs typeface="ヒラギノ角ゴ ProN W3" charset="0"/>
+                <a:sym typeface="Gill Sans" charset="0"/>
+              </a:defRPr>
+            </a:lvl3pPr>
+            <a:lvl4pPr marL="1600200" indent="-228600" eaLnBrk="0" hangingPunct="0">
+              <a:tabLst>
+                <a:tab pos="1878013" algn="l"/>
+              </a:tabLst>
+              <a:defRPr sz="5600">
+                <a:solidFill>
+                  <a:srgbClr val="000000"/>
+                </a:solidFill>
+                <a:latin typeface="Gill Sans" charset="0"/>
+                <a:ea typeface="ヒラギノ角ゴ ProN W3" charset="0"/>
+                <a:cs typeface="ヒラギノ角ゴ ProN W3" charset="0"/>
+                <a:sym typeface="Gill Sans" charset="0"/>
+              </a:defRPr>
+            </a:lvl4pPr>
+            <a:lvl5pPr marL="2057400" indent="-228600" eaLnBrk="0" hangingPunct="0">
+              <a:tabLst>
+                <a:tab pos="1878013" algn="l"/>
+              </a:tabLst>
+              <a:defRPr sz="5600">
+                <a:solidFill>
+                  <a:srgbClr val="000000"/>
+                </a:solidFill>
+                <a:latin typeface="Gill Sans" charset="0"/>
+                <a:ea typeface="ヒラギノ角ゴ ProN W3" charset="0"/>
+                <a:cs typeface="ヒラギノ角ゴ ProN W3" charset="0"/>
+                <a:sym typeface="Gill Sans" charset="0"/>
+              </a:defRPr>
+            </a:lvl5pPr>
+            <a:lvl6pPr marL="2514600" indent="-228600" algn="ctr" eaLnBrk="0" fontAlgn="base" hangingPunct="0">
+              <a:spcBef>
+                <a:spcPct val="0"/>
+              </a:spcBef>
+              <a:spcAft>
+                <a:spcPct val="0"/>
+              </a:spcAft>
+              <a:tabLst>
+                <a:tab pos="1878013" algn="l"/>
+              </a:tabLst>
+              <a:defRPr sz="5600">
+                <a:solidFill>
+                  <a:srgbClr val="000000"/>
+                </a:solidFill>
+                <a:latin typeface="Gill Sans" charset="0"/>
+                <a:ea typeface="ヒラギノ角ゴ ProN W3" charset="0"/>
+                <a:cs typeface="ヒラギノ角ゴ ProN W3" charset="0"/>
+                <a:sym typeface="Gill Sans" charset="0"/>
+              </a:defRPr>
+            </a:lvl6pPr>
+            <a:lvl7pPr marL="2971800" indent="-228600" algn="ctr" eaLnBrk="0" fontAlgn="base" hangingPunct="0">
+              <a:spcBef>
+                <a:spcPct val="0"/>
+              </a:spcBef>
+              <a:spcAft>
+                <a:spcPct val="0"/>
+              </a:spcAft>
+              <a:tabLst>
+                <a:tab pos="1878013" algn="l"/>
+              </a:tabLst>
+              <a:defRPr sz="5600">
+                <a:solidFill>
+                  <a:srgbClr val="000000"/>
+                </a:solidFill>
+                <a:latin typeface="Gill Sans" charset="0"/>
+                <a:ea typeface="ヒラギノ角ゴ ProN W3" charset="0"/>
+                <a:cs typeface="ヒラギノ角ゴ ProN W3" charset="0"/>
+                <a:sym typeface="Gill Sans" charset="0"/>
+              </a:defRPr>
+            </a:lvl7pPr>
+            <a:lvl8pPr marL="3429000" indent="-228600" algn="ctr" eaLnBrk="0" fontAlgn="base" hangingPunct="0">
+              <a:spcBef>
+                <a:spcPct val="0"/>
+              </a:spcBef>
+              <a:spcAft>
+                <a:spcPct val="0"/>
+              </a:spcAft>
+              <a:tabLst>
+                <a:tab pos="1878013" algn="l"/>
+              </a:tabLst>
+              <a:defRPr sz="5600">
+                <a:solidFill>
+                  <a:srgbClr val="000000"/>
+                </a:solidFill>
+                <a:latin typeface="Gill Sans" charset="0"/>
+                <a:ea typeface="ヒラギノ角ゴ ProN W3" charset="0"/>
+                <a:cs typeface="ヒラギノ角ゴ ProN W3" charset="0"/>
+                <a:sym typeface="Gill Sans" charset="0"/>
+              </a:defRPr>
+            </a:lvl8pPr>
+            <a:lvl9pPr marL="3886200" indent="-228600" algn="ctr" eaLnBrk="0" fontAlgn="base" hangingPunct="0">
+              <a:spcBef>
+                <a:spcPct val="0"/>
+              </a:spcBef>
+              <a:spcAft>
+                <a:spcPct val="0"/>
+              </a:spcAft>
+              <a:tabLst>
+                <a:tab pos="1878013" algn="l"/>
+              </a:tabLst>
+              <a:defRPr sz="5600">
+                <a:solidFill>
+                  <a:srgbClr val="000000"/>
+                </a:solidFill>
+                <a:latin typeface="Gill Sans" charset="0"/>
+                <a:ea typeface="ヒラギノ角ゴ ProN W3" charset="0"/>
+                <a:cs typeface="ヒラギノ角ゴ ProN W3" charset="0"/>
+                <a:sym typeface="Gill Sans" charset="0"/>
+              </a:defRPr>
+            </a:lvl9pPr>
+          </a:lstStyle>
+          <a:p>
+            <a:pPr marL="342900" marR="0" lvl="0" indent="-342900" algn="l" defTabSz="914400" rtl="0" eaLnBrk="0" fontAlgn="auto" latinLnBrk="0" hangingPunct="0">
+              <a:lnSpc>
+                <a:spcPct val="130000"/>
+              </a:lnSpc>
+              <a:spcBef>
+                <a:spcPts val="0"/>
+              </a:spcBef>
+              <a:spcAft>
+                <a:spcPts val="0"/>
+              </a:spcAft>
+              <a:buClrTx/>
+              <a:buSzTx/>
+              <a:buFontTx/>
+              <a:buNone/>
+              <a:tabLst>
+                <a:tab pos="1878013" algn="l"/>
+              </a:tabLst>
+              <a:defRPr/>
+            </a:pPr>
+            <a:r>
+              <a:rPr lang="nl-NL" sz="2200" b="1" dirty="0">
+                <a:solidFill>
+                  <a:schemeClr val="bg1"/>
+                </a:solidFill>
+                <a:effectLst>
+                  <a:outerShdw blurRad="38100" dist="38100" dir="2700000" algn="tl">
+                    <a:srgbClr val="000000">
+                      <a:alpha val="43137"/>
+                    </a:srgbClr>
+                  </a:outerShdw>
+                </a:effectLst>
+                <a:latin typeface="Century Gothic"/>
+                <a:cs typeface="Century Gothic"/>
+              </a:rPr>
+              <a:t>Koffermoment</a:t>
+            </a:r>
+          </a:p>
+          <a:p>
+            <a:pPr lvl="0">
+              <a:lnSpc>
+                <a:spcPct val="130000"/>
+              </a:lnSpc>
+            </a:pPr>
+            <a:r>
+              <a:rPr lang="nl-NL" sz="2200" b="1" dirty="0">
+                <a:solidFill>
+                  <a:schemeClr val="bg1"/>
+                </a:solidFill>
+                <a:effectLst>
+                  <a:outerShdw blurRad="38100" dist="38100" dir="2700000" algn="tl">
+                    <a:srgbClr val="000000">
+                      <a:alpha val="43137"/>
+                    </a:srgbClr>
+                  </a:outerShdw>
+                </a:effectLst>
+                <a:latin typeface="Century Gothic"/>
+                <a:cs typeface="Century Gothic"/>
+              </a:rPr>
+              <a:t>Lezen: Romeinen 6 : 1 - 14</a:t>
+            </a:r>
+          </a:p>
+          <a:p>
+            <a:pPr lvl="0">
+              <a:lnSpc>
+                <a:spcPct val="130000"/>
+              </a:lnSpc>
+            </a:pPr>
+            <a:r>
+              <a:rPr lang="nl-NL" sz="2200" b="1" dirty="0" err="1">
+                <a:solidFill>
+                  <a:schemeClr val="bg1"/>
+                </a:solidFill>
+                <a:effectLst>
+                  <a:outerShdw blurRad="38100" dist="38100" dir="2700000" algn="tl">
+                    <a:srgbClr val="000000">
+                      <a:alpha val="43137"/>
+                    </a:srgbClr>
+                  </a:outerShdw>
+                </a:effectLst>
+                <a:latin typeface="Century Gothic"/>
+                <a:cs typeface="Century Gothic"/>
+              </a:rPr>
+              <a:t>LvK</a:t>
+            </a:r>
+            <a:r>
+              <a:rPr lang="nl-NL" sz="2200" b="1" dirty="0">
+                <a:solidFill>
+                  <a:schemeClr val="bg1"/>
+                </a:solidFill>
+                <a:effectLst>
+                  <a:outerShdw blurRad="38100" dist="38100" dir="2700000" algn="tl">
+                    <a:srgbClr val="000000">
+                      <a:alpha val="43137"/>
+                    </a:srgbClr>
+                  </a:outerShdw>
+                </a:effectLst>
+                <a:latin typeface="Century Gothic"/>
+                <a:cs typeface="Century Gothic"/>
+              </a:rPr>
+              <a:t> 87 : 1, 2, 4, 5</a:t>
+            </a:r>
+          </a:p>
+          <a:p>
+            <a:pPr lvl="0">
+              <a:lnSpc>
+                <a:spcPct val="130000"/>
+              </a:lnSpc>
+            </a:pPr>
+            <a:r>
+              <a:rPr lang="nl-NL" sz="2200" b="1" dirty="0">
+                <a:solidFill>
+                  <a:schemeClr val="bg1"/>
+                </a:solidFill>
+                <a:effectLst>
+                  <a:outerShdw blurRad="38100" dist="38100" dir="2700000" algn="tl">
+                    <a:srgbClr val="000000">
+                      <a:alpha val="43137"/>
+                    </a:srgbClr>
+                  </a:outerShdw>
+                </a:effectLst>
+                <a:latin typeface="Century Gothic"/>
+                <a:cs typeface="Century Gothic"/>
+              </a:rPr>
+              <a:t>Verkondiging</a:t>
+            </a:r>
+          </a:p>
+          <a:p>
+            <a:pPr lvl="0">
+              <a:lnSpc>
+                <a:spcPct val="130000"/>
+              </a:lnSpc>
+            </a:pPr>
+            <a:r>
+              <a:rPr lang="nl-NL" sz="2200" b="1" dirty="0">
+                <a:solidFill>
+                  <a:schemeClr val="bg1"/>
+                </a:solidFill>
+                <a:effectLst>
+                  <a:outerShdw blurRad="38100" dist="38100" dir="2700000" algn="tl">
+                    <a:srgbClr val="000000">
+                      <a:alpha val="43137"/>
+                    </a:srgbClr>
+                  </a:outerShdw>
+                </a:effectLst>
+                <a:latin typeface="Century Gothic"/>
+                <a:cs typeface="Century Gothic"/>
+              </a:rPr>
+              <a:t>Jezus leeft en ik in Hem</a:t>
+            </a:r>
+          </a:p>
+          <a:p>
+            <a:pPr lvl="0">
+              <a:lnSpc>
+                <a:spcPct val="130000"/>
+              </a:lnSpc>
+            </a:pPr>
+            <a:r>
+              <a:rPr lang="nl-NL" sz="2200" b="1" dirty="0">
+                <a:solidFill>
+                  <a:schemeClr val="bg1"/>
+                </a:solidFill>
+                <a:effectLst>
+                  <a:outerShdw blurRad="38100" dist="38100" dir="2700000" algn="tl">
+                    <a:srgbClr val="000000">
+                      <a:alpha val="43137"/>
+                    </a:srgbClr>
+                  </a:outerShdw>
+                </a:effectLst>
+                <a:latin typeface="Century Gothic"/>
+                <a:cs typeface="Century Gothic"/>
+              </a:rPr>
+              <a:t>Gebed</a:t>
+            </a:r>
+          </a:p>
+          <a:p>
+            <a:pPr lvl="0">
+              <a:lnSpc>
+                <a:spcPct val="130000"/>
+              </a:lnSpc>
+            </a:pPr>
+            <a:r>
+              <a:rPr lang="nl-NL" sz="2200" b="1" dirty="0">
+                <a:solidFill>
+                  <a:schemeClr val="bg1"/>
+                </a:solidFill>
+                <a:effectLst>
+                  <a:outerShdw blurRad="38100" dist="38100" dir="2700000" algn="tl">
+                    <a:srgbClr val="000000">
+                      <a:alpha val="43137"/>
+                    </a:srgbClr>
+                  </a:outerShdw>
+                </a:effectLst>
+                <a:latin typeface="Century Gothic"/>
+                <a:cs typeface="Century Gothic"/>
+              </a:rPr>
+              <a:t>Avondmaalsformulier</a:t>
+            </a:r>
+          </a:p>
+          <a:p>
+            <a:pPr lvl="0">
+              <a:lnSpc>
+                <a:spcPct val="130000"/>
+              </a:lnSpc>
+            </a:pPr>
+            <a:r>
+              <a:rPr lang="nl-NL" sz="2200" b="1" dirty="0">
+                <a:solidFill>
+                  <a:schemeClr val="bg1"/>
+                </a:solidFill>
+                <a:effectLst>
+                  <a:outerShdw blurRad="38100" dist="38100" dir="2700000" algn="tl">
+                    <a:srgbClr val="000000">
+                      <a:alpha val="43137"/>
+                    </a:srgbClr>
+                  </a:outerShdw>
+                </a:effectLst>
+                <a:latin typeface="Century Gothic"/>
+                <a:cs typeface="Century Gothic"/>
+              </a:rPr>
+              <a:t>Avondmaalsviering</a:t>
+            </a:r>
+          </a:p>
+          <a:p>
+            <a:pPr lvl="0">
+              <a:lnSpc>
+                <a:spcPct val="130000"/>
+              </a:lnSpc>
+            </a:pPr>
+            <a:r>
+              <a:rPr lang="nl-NL" sz="2200" b="1" dirty="0">
+                <a:solidFill>
+                  <a:schemeClr val="bg1"/>
+                </a:solidFill>
+                <a:effectLst>
+                  <a:outerShdw blurRad="38100" dist="38100" dir="2700000" algn="tl">
+                    <a:srgbClr val="000000">
+                      <a:alpha val="43137"/>
+                    </a:srgbClr>
+                  </a:outerShdw>
+                </a:effectLst>
+                <a:latin typeface="Century Gothic"/>
+                <a:cs typeface="Century Gothic"/>
+              </a:rPr>
+              <a:t>Collectie</a:t>
+            </a:r>
+          </a:p>
+          <a:p>
+            <a:pPr lvl="0">
+              <a:lnSpc>
+                <a:spcPct val="130000"/>
+              </a:lnSpc>
+            </a:pPr>
+            <a:r>
+              <a:rPr lang="nl-NL" sz="2200" b="1" dirty="0">
+                <a:solidFill>
+                  <a:schemeClr val="bg1"/>
+                </a:solidFill>
+                <a:effectLst>
+                  <a:outerShdw blurRad="38100" dist="38100" dir="2700000" algn="tl">
+                    <a:srgbClr val="000000">
+                      <a:alpha val="43137"/>
+                    </a:srgbClr>
+                  </a:outerShdw>
+                </a:effectLst>
+                <a:latin typeface="Century Gothic"/>
+                <a:cs typeface="Century Gothic"/>
+              </a:rPr>
+              <a:t>GKB 95 : 1 – 4</a:t>
+            </a:r>
+          </a:p>
+          <a:p>
+            <a:pPr lvl="0">
+              <a:lnSpc>
+                <a:spcPct val="130000"/>
+              </a:lnSpc>
+            </a:pPr>
+            <a:r>
+              <a:rPr lang="nl-NL" sz="2200" b="1" dirty="0">
+                <a:solidFill>
+                  <a:schemeClr val="bg1"/>
+                </a:solidFill>
+                <a:effectLst>
+                  <a:outerShdw blurRad="38100" dist="38100" dir="2700000" algn="tl">
+                    <a:srgbClr val="000000">
+                      <a:alpha val="43137"/>
+                    </a:srgbClr>
+                  </a:outerShdw>
+                </a:effectLst>
+                <a:latin typeface="Century Gothic"/>
+                <a:cs typeface="Century Gothic"/>
+              </a:rPr>
+              <a:t>Zegen</a:t>
+            </a:r>
+          </a:p>
+        </p:txBody>
+      </p:sp>
+    </p:spTree>
+    <p:extLst>
+      <p:ext uri="{BB962C8B-B14F-4D97-AF65-F5344CB8AC3E}">
+        <p14:creationId xmlns:p14="http://schemas.microsoft.com/office/powerpoint/2010/main" val="3648809006"/>
+      </p:ext>
+    </p:extLst>
+  </p:cSld>
+  <p:clrMapOvr>
+    <a:masterClrMapping/>
+  </p:clrMapOvr>
+</p:sldLayout>
+</file>
+
+<file path=ppt/slideLayouts/slideLayout13.xml><?xml version="1.0" encoding="utf-8"?>
+<p:sldLayout xmlns:a="http://schemas.openxmlformats.org/drawingml/2006/main" xmlns:r="http://schemas.openxmlformats.org/officeDocument/2006/relationships" xmlns:p="http://schemas.openxmlformats.org/presentationml/2006/main" preserve="1" userDrawn="1">
+  <p:cSld name="votum en zegengroet">
+    <p:bg>
+      <p:bgPr>
+        <a:blipFill dpi="0" rotWithShape="1">
+          <a:blip r:embed="rId2">
+            <a:lum/>
+          </a:blip>
+          <a:srcRect/>
+          <a:stretch>
+            <a:fillRect/>
+          </a:stretch>
+        </a:blipFill>
+        <a:effectLst/>
+      </p:bgPr>
+    </p:bg>
+    <p:spTree>
+      <p:nvGrpSpPr>
+        <p:cNvPr id="1" name=""/>
+        <p:cNvGrpSpPr/>
+        <p:nvPr/>
+      </p:nvGrpSpPr>
+      <p:grpSpPr>
+        <a:xfrm>
+          <a:off x="0" y="0"/>
+          <a:ext cx="0" cy="0"/>
+          <a:chOff x="0" y="0"/>
+          <a:chExt cx="0" cy="0"/>
+        </a:xfrm>
+      </p:grpSpPr>
+    </p:spTree>
+    <p:extLst>
+      <p:ext uri="{BB962C8B-B14F-4D97-AF65-F5344CB8AC3E}">
+        <p14:creationId xmlns:p14="http://schemas.microsoft.com/office/powerpoint/2010/main" val="3168007587"/>
+      </p:ext>
+    </p:extLst>
+  </p:cSld>
+  <p:clrMapOvr>
+    <a:masterClrMapping/>
+  </p:clrMapOvr>
+</p:sldLayout>
+</file>
+
+<file path=ppt/slideLayouts/slideLayout14.xml><?xml version="1.0" encoding="utf-8"?>
+<p:sldLayout xmlns:a="http://schemas.openxmlformats.org/drawingml/2006/main" xmlns:r="http://schemas.openxmlformats.org/officeDocument/2006/relationships" xmlns:p="http://schemas.openxmlformats.org/presentationml/2006/main" preserve="1" userDrawn="1">
+  <p:cSld name="kringen 1">
+    <p:bg>
+      <p:bgPr>
+        <a:blipFill dpi="0" rotWithShape="1">
+          <a:blip r:embed="rId2">
+            <a:lum/>
+          </a:blip>
+          <a:srcRect/>
+          <a:stretch>
+            <a:fillRect/>
+          </a:stretch>
+        </a:blipFill>
+        <a:effectLst/>
+      </p:bgPr>
+    </p:bg>
+    <p:spTree>
+      <p:nvGrpSpPr>
+        <p:cNvPr id="1" name=""/>
+        <p:cNvGrpSpPr/>
+        <p:nvPr/>
+      </p:nvGrpSpPr>
+      <p:grpSpPr>
+        <a:xfrm>
+          <a:off x="0" y="0"/>
+          <a:ext cx="0" cy="0"/>
+          <a:chOff x="0" y="0"/>
+          <a:chExt cx="0" cy="0"/>
+        </a:xfrm>
+      </p:grpSpPr>
+    </p:spTree>
+    <p:extLst>
+      <p:ext uri="{BB962C8B-B14F-4D97-AF65-F5344CB8AC3E}">
+        <p14:creationId xmlns:p14="http://schemas.microsoft.com/office/powerpoint/2010/main" val="2549626394"/>
+      </p:ext>
+    </p:extLst>
+  </p:cSld>
+  <p:clrMapOvr>
+    <a:masterClrMapping/>
+  </p:clrMapOvr>
+</p:sldLayout>
+</file>
+
+<file path=ppt/slideLayouts/slideLayout15.xml><?xml version="1.0" encoding="utf-8"?>
+<p:sldLayout xmlns:a="http://schemas.openxmlformats.org/drawingml/2006/main" xmlns:r="http://schemas.openxmlformats.org/officeDocument/2006/relationships" xmlns:p="http://schemas.openxmlformats.org/presentationml/2006/main" preserve="1" userDrawn="1">
+  <p:cSld name="kringen 2">
+    <p:bg>
+      <p:bgPr>
+        <a:blipFill dpi="0" rotWithShape="1">
+          <a:blip r:embed="rId2">
+            <a:lum/>
+          </a:blip>
+          <a:srcRect/>
+          <a:stretch>
+            <a:fillRect/>
+          </a:stretch>
+        </a:blipFill>
+        <a:effectLst/>
+      </p:bgPr>
+    </p:bg>
+    <p:spTree>
+      <p:nvGrpSpPr>
+        <p:cNvPr id="1" name=""/>
+        <p:cNvGrpSpPr/>
+        <p:nvPr/>
+      </p:nvGrpSpPr>
+      <p:grpSpPr>
+        <a:xfrm>
+          <a:off x="0" y="0"/>
+          <a:ext cx="0" cy="0"/>
+          <a:chOff x="0" y="0"/>
+          <a:chExt cx="0" cy="0"/>
+        </a:xfrm>
+      </p:grpSpPr>
+    </p:spTree>
+    <p:extLst>
+      <p:ext uri="{BB962C8B-B14F-4D97-AF65-F5344CB8AC3E}">
+        <p14:creationId xmlns:p14="http://schemas.microsoft.com/office/powerpoint/2010/main" val="1199528647"/>
+      </p:ext>
+    </p:extLst>
+  </p:cSld>
+  <p:clrMapOvr>
+    <a:masterClrMapping/>
+  </p:clrMapOvr>
+</p:sldLayout>
+</file>
+
+<file path=ppt/slideLayouts/slideLayout16.xml><?xml version="1.0" encoding="utf-8"?>
+<p:sldLayout xmlns:a="http://schemas.openxmlformats.org/drawingml/2006/main" xmlns:r="http://schemas.openxmlformats.org/officeDocument/2006/relationships" xmlns:p="http://schemas.openxmlformats.org/presentationml/2006/main" preserve="1" userDrawn="1">
+  <p:cSld name="zingen">
+    <p:bg>
+      <p:bgPr>
+        <a:blipFill dpi="0" rotWithShape="1">
+          <a:blip r:embed="rId2">
+            <a:lum/>
+          </a:blip>
+          <a:srcRect/>
+          <a:stretch>
+            <a:fillRect/>
+          </a:stretch>
+        </a:blipFill>
+        <a:effectLst/>
+      </p:bgPr>
+    </p:bg>
+    <p:spTree>
+      <p:nvGrpSpPr>
+        <p:cNvPr id="1" name=""/>
+        <p:cNvGrpSpPr/>
+        <p:nvPr/>
+      </p:nvGrpSpPr>
+      <p:grpSpPr>
+        <a:xfrm>
+          <a:off x="0" y="0"/>
+          <a:ext cx="0" cy="0"/>
+          <a:chOff x="0" y="0"/>
+          <a:chExt cx="0" cy="0"/>
+        </a:xfrm>
+      </p:grpSpPr>
+    </p:spTree>
+    <p:extLst>
+      <p:ext uri="{BB962C8B-B14F-4D97-AF65-F5344CB8AC3E}">
+        <p14:creationId xmlns:p14="http://schemas.microsoft.com/office/powerpoint/2010/main" val="2859859899"/>
+      </p:ext>
+    </p:extLst>
+  </p:cSld>
+  <p:clrMapOvr>
+    <a:masterClrMapping/>
+  </p:clrMapOvr>
+</p:sldLayout>
+</file>
+
+<file path=ppt/slideLayouts/slideLayout17.xml><?xml version="1.0" encoding="utf-8"?>
+<p:sldLayout xmlns:a="http://schemas.openxmlformats.org/drawingml/2006/main" xmlns:r="http://schemas.openxmlformats.org/officeDocument/2006/relationships" xmlns:p="http://schemas.openxmlformats.org/presentationml/2006/main" preserve="1" userDrawn="1">
+  <p:cSld name="notenbalk">
+    <p:bg>
+      <p:bgPr>
+        <a:blipFill dpi="0" rotWithShape="1">
+          <a:blip r:embed="rId2">
+            <a:lum/>
+          </a:blip>
+          <a:srcRect/>
+          <a:stretch>
+            <a:fillRect/>
+          </a:stretch>
+        </a:blipFill>
+        <a:effectLst/>
+      </p:bgPr>
+    </p:bg>
+    <p:spTree>
+      <p:nvGrpSpPr>
+        <p:cNvPr id="1" name=""/>
+        <p:cNvGrpSpPr/>
+        <p:nvPr/>
+      </p:nvGrpSpPr>
+      <p:grpSpPr>
+        <a:xfrm>
+          <a:off x="0" y="0"/>
+          <a:ext cx="0" cy="0"/>
+          <a:chOff x="0" y="0"/>
+          <a:chExt cx="0" cy="0"/>
+        </a:xfrm>
+      </p:grpSpPr>
+    </p:spTree>
+    <p:extLst>
+      <p:ext uri="{BB962C8B-B14F-4D97-AF65-F5344CB8AC3E}">
+        <p14:creationId xmlns:p14="http://schemas.microsoft.com/office/powerpoint/2010/main" val="2062011831"/>
+      </p:ext>
+    </p:extLst>
+  </p:cSld>
+  <p:clrMapOvr>
+    <a:masterClrMapping/>
+  </p:clrMapOvr>
+</p:sldLayout>
+</file>
+
+<file path=ppt/slideLayouts/slideLayout18.xml><?xml version="1.0" encoding="utf-8"?>
+<p:sldLayout xmlns:a="http://schemas.openxmlformats.org/drawingml/2006/main" xmlns:r="http://schemas.openxmlformats.org/officeDocument/2006/relationships" xmlns:p="http://schemas.openxmlformats.org/presentationml/2006/main" preserve="1" userDrawn="1">
+  <p:cSld name="luisteren">
+    <p:bg>
+      <p:bgPr>
+        <a:blipFill dpi="0" rotWithShape="1">
+          <a:blip r:embed="rId2">
+            <a:lum/>
+          </a:blip>
+          <a:srcRect/>
+          <a:stretch>
+            <a:fillRect/>
+          </a:stretch>
+        </a:blipFill>
+        <a:effectLst/>
+      </p:bgPr>
+    </p:bg>
+    <p:spTree>
+      <p:nvGrpSpPr>
+        <p:cNvPr id="1" name=""/>
+        <p:cNvGrpSpPr/>
+        <p:nvPr/>
+      </p:nvGrpSpPr>
+      <p:grpSpPr>
+        <a:xfrm>
+          <a:off x="0" y="0"/>
+          <a:ext cx="0" cy="0"/>
+          <a:chOff x="0" y="0"/>
+          <a:chExt cx="0" cy="0"/>
+        </a:xfrm>
+      </p:grpSpPr>
+    </p:spTree>
+    <p:extLst>
+      <p:ext uri="{BB962C8B-B14F-4D97-AF65-F5344CB8AC3E}">
+        <p14:creationId xmlns:p14="http://schemas.microsoft.com/office/powerpoint/2010/main" val="2932440151"/>
+      </p:ext>
+    </p:extLst>
+  </p:cSld>
+  <p:clrMapOvr>
+    <a:masterClrMapping/>
+  </p:clrMapOvr>
+</p:sldLayout>
+</file>
+
+<file path=ppt/slideLayouts/slideLayout19.xml><?xml version="1.0" encoding="utf-8"?>
+<p:sldLayout xmlns:a="http://schemas.openxmlformats.org/drawingml/2006/main" xmlns:r="http://schemas.openxmlformats.org/officeDocument/2006/relationships" xmlns:p="http://schemas.openxmlformats.org/presentationml/2006/main" preserve="1" userDrawn="1">
+  <p:cSld name="koffermoment">
+    <p:bg>
+      <p:bgPr>
+        <a:blipFill dpi="0" rotWithShape="1">
+          <a:blip r:embed="rId2">
+            <a:lum/>
+          </a:blip>
+          <a:srcRect/>
+          <a:stretch>
+            <a:fillRect/>
+          </a:stretch>
+        </a:blipFill>
+        <a:effectLst/>
+      </p:bgPr>
+    </p:bg>
+    <p:spTree>
+      <p:nvGrpSpPr>
+        <p:cNvPr id="1" name=""/>
+        <p:cNvGrpSpPr/>
+        <p:nvPr/>
+      </p:nvGrpSpPr>
+      <p:grpSpPr>
+        <a:xfrm>
+          <a:off x="0" y="0"/>
+          <a:ext cx="0" cy="0"/>
+          <a:chOff x="0" y="0"/>
+          <a:chExt cx="0" cy="0"/>
+        </a:xfrm>
+      </p:grpSpPr>
+    </p:spTree>
+    <p:extLst>
+      <p:ext uri="{BB962C8B-B14F-4D97-AF65-F5344CB8AC3E}">
+        <p14:creationId xmlns:p14="http://schemas.microsoft.com/office/powerpoint/2010/main" val="4200291143"/>
+      </p:ext>
+    </p:extLst>
+  </p:cSld>
+  <p:clrMapOvr>
+    <a:masterClrMapping/>
+  </p:clrMapOvr>
+</p:sldLayout>
+</file>
+
 <file path=ppt/slideLayouts/slideLayout2.xml><?xml version="1.0" encoding="utf-8"?>
 <p:sldLayout xmlns:a="http://schemas.openxmlformats.org/drawingml/2006/main" xmlns:r="http://schemas.openxmlformats.org/officeDocument/2006/relationships" xmlns:p="http://schemas.openxmlformats.org/presentationml/2006/main" preserve="1" userDrawn="1">
   <p:cSld name="programma">
@@ -3030,14 +4461,14 @@
           </a:ln>
           <a:extLst>
             <a:ext uri="{909E8E84-426E-40dd-AFC4-6F175D3DCCD1}">
-              <a14:hiddenFill xmlns:a14="http://schemas.microsoft.com/office/drawing/2010/main" xmlns="">
+              <a14:hiddenFill xmlns="" xmlns:a14="http://schemas.microsoft.com/office/drawing/2010/main">
                 <a:solidFill>
                   <a:srgbClr val="FFFFFF"/>
                 </a:solidFill>
               </a14:hiddenFill>
             </a:ext>
             <a:ext uri="{91240B29-F687-4f45-9708-019B960494DF}">
-              <a14:hiddenLine xmlns:a14="http://schemas.microsoft.com/office/drawing/2010/main" xmlns="" w="9525">
+              <a14:hiddenLine xmlns="" xmlns:a14="http://schemas.microsoft.com/office/drawing/2010/main" w="9525">
                 <a:solidFill>
                   <a:srgbClr val="000000"/>
                 </a:solidFill>
@@ -3522,14 +4953,14 @@
           </a:ln>
           <a:extLst>
             <a:ext uri="{909E8E84-426E-40dd-AFC4-6F175D3DCCD1}">
-              <a14:hiddenFill xmlns:a14="http://schemas.microsoft.com/office/drawing/2010/main" xmlns="">
+              <a14:hiddenFill xmlns="" xmlns:a14="http://schemas.microsoft.com/office/drawing/2010/main">
                 <a:solidFill>
                   <a:srgbClr val="FFFFFF"/>
                 </a:solidFill>
               </a14:hiddenFill>
             </a:ext>
             <a:ext uri="{91240B29-F687-4f45-9708-019B960494DF}">
-              <a14:hiddenLine xmlns:a14="http://schemas.microsoft.com/office/drawing/2010/main" xmlns="" w="9525">
+              <a14:hiddenLine xmlns="" xmlns:a14="http://schemas.microsoft.com/office/drawing/2010/main" w="9525">
                 <a:solidFill>
                   <a:srgbClr val="000000"/>
                 </a:solidFill>
@@ -3997,6 +5428,585 @@
     <p:extLst>
       <p:ext uri="{BB962C8B-B14F-4D97-AF65-F5344CB8AC3E}">
         <p14:creationId xmlns:p14="http://schemas.microsoft.com/office/powerpoint/2010/main" val="427450312"/>
+      </p:ext>
+    </p:extLst>
+  </p:cSld>
+  <p:clrMapOvr>
+    <a:masterClrMapping/>
+  </p:clrMapOvr>
+</p:sldLayout>
+</file>
+
+<file path=ppt/slideLayouts/slideLayout20.xml><?xml version="1.0" encoding="utf-8"?>
+<p:sldLayout xmlns:a="http://schemas.openxmlformats.org/drawingml/2006/main" xmlns:r="http://schemas.openxmlformats.org/officeDocument/2006/relationships" xmlns:p="http://schemas.openxmlformats.org/presentationml/2006/main" preserve="1" userDrawn="1">
+  <p:cSld name="tienermoment">
+    <p:bg>
+      <p:bgPr>
+        <a:blipFill dpi="0" rotWithShape="1">
+          <a:blip r:embed="rId2">
+            <a:lum/>
+          </a:blip>
+          <a:srcRect/>
+          <a:stretch>
+            <a:fillRect/>
+          </a:stretch>
+        </a:blipFill>
+        <a:effectLst/>
+      </p:bgPr>
+    </p:bg>
+    <p:spTree>
+      <p:nvGrpSpPr>
+        <p:cNvPr id="1" name=""/>
+        <p:cNvGrpSpPr/>
+        <p:nvPr/>
+      </p:nvGrpSpPr>
+      <p:grpSpPr>
+        <a:xfrm>
+          <a:off x="0" y="0"/>
+          <a:ext cx="0" cy="0"/>
+          <a:chOff x="0" y="0"/>
+          <a:chExt cx="0" cy="0"/>
+        </a:xfrm>
+      </p:grpSpPr>
+    </p:spTree>
+    <p:extLst>
+      <p:ext uri="{BB962C8B-B14F-4D97-AF65-F5344CB8AC3E}">
+        <p14:creationId xmlns:p14="http://schemas.microsoft.com/office/powerpoint/2010/main" val="991239337"/>
+      </p:ext>
+    </p:extLst>
+  </p:cSld>
+  <p:clrMapOvr>
+    <a:masterClrMapping/>
+  </p:clrMapOvr>
+</p:sldLayout>
+</file>
+
+<file path=ppt/slideLayouts/slideLayout21.xml><?xml version="1.0" encoding="utf-8"?>
+<p:sldLayout xmlns:a="http://schemas.openxmlformats.org/drawingml/2006/main" xmlns:r="http://schemas.openxmlformats.org/officeDocument/2006/relationships" xmlns:p="http://schemas.openxmlformats.org/presentationml/2006/main" preserve="1" userDrawn="1">
+  <p:cSld name="tienermoment invulling">
+    <p:bg>
+      <p:bgPr>
+        <a:blipFill dpi="0" rotWithShape="1">
+          <a:blip r:embed="rId2">
+            <a:lum/>
+          </a:blip>
+          <a:srcRect/>
+          <a:stretch>
+            <a:fillRect/>
+          </a:stretch>
+        </a:blipFill>
+        <a:effectLst/>
+      </p:bgPr>
+    </p:bg>
+    <p:spTree>
+      <p:nvGrpSpPr>
+        <p:cNvPr id="1" name=""/>
+        <p:cNvGrpSpPr/>
+        <p:nvPr/>
+      </p:nvGrpSpPr>
+      <p:grpSpPr>
+        <a:xfrm>
+          <a:off x="0" y="0"/>
+          <a:ext cx="0" cy="0"/>
+          <a:chOff x="0" y="0"/>
+          <a:chExt cx="0" cy="0"/>
+        </a:xfrm>
+      </p:grpSpPr>
+    </p:spTree>
+    <p:extLst>
+      <p:ext uri="{BB962C8B-B14F-4D97-AF65-F5344CB8AC3E}">
+        <p14:creationId xmlns:p14="http://schemas.microsoft.com/office/powerpoint/2010/main" val="2523357403"/>
+      </p:ext>
+    </p:extLst>
+  </p:cSld>
+  <p:clrMapOvr>
+    <a:masterClrMapping/>
+  </p:clrMapOvr>
+</p:sldLayout>
+</file>
+
+<file path=ppt/slideLayouts/slideLayout22.xml><?xml version="1.0" encoding="utf-8"?>
+<p:sldLayout xmlns:a="http://schemas.openxmlformats.org/drawingml/2006/main" xmlns:r="http://schemas.openxmlformats.org/officeDocument/2006/relationships" xmlns:p="http://schemas.openxmlformats.org/presentationml/2006/main" preserve="1" userDrawn="1">
+  <p:cSld name="lezen">
+    <p:bg>
+      <p:bgPr>
+        <a:blipFill dpi="0" rotWithShape="1">
+          <a:blip r:embed="rId2">
+            <a:lum/>
+          </a:blip>
+          <a:srcRect/>
+          <a:stretch>
+            <a:fillRect/>
+          </a:stretch>
+        </a:blipFill>
+        <a:effectLst/>
+      </p:bgPr>
+    </p:bg>
+    <p:spTree>
+      <p:nvGrpSpPr>
+        <p:cNvPr id="1" name=""/>
+        <p:cNvGrpSpPr/>
+        <p:nvPr/>
+      </p:nvGrpSpPr>
+      <p:grpSpPr>
+        <a:xfrm>
+          <a:off x="0" y="0"/>
+          <a:ext cx="0" cy="0"/>
+          <a:chOff x="0" y="0"/>
+          <a:chExt cx="0" cy="0"/>
+        </a:xfrm>
+      </p:grpSpPr>
+    </p:spTree>
+    <p:extLst>
+      <p:ext uri="{BB962C8B-B14F-4D97-AF65-F5344CB8AC3E}">
+        <p14:creationId xmlns:p14="http://schemas.microsoft.com/office/powerpoint/2010/main" val="3265307927"/>
+      </p:ext>
+    </p:extLst>
+  </p:cSld>
+  <p:clrMapOvr>
+    <a:masterClrMapping/>
+  </p:clrMapOvr>
+</p:sldLayout>
+</file>
+
+<file path=ppt/slideLayouts/slideLayout23.xml><?xml version="1.0" encoding="utf-8"?>
+<p:sldLayout xmlns:a="http://schemas.openxmlformats.org/drawingml/2006/main" xmlns:r="http://schemas.openxmlformats.org/officeDocument/2006/relationships" xmlns:p="http://schemas.openxmlformats.org/presentationml/2006/main" preserve="1" userDrawn="1">
+  <p:cSld name="lezen (tekst)">
+    <p:bg>
+      <p:bgPr>
+        <a:blipFill dpi="0" rotWithShape="1">
+          <a:blip r:embed="rId2">
+            <a:lum/>
+          </a:blip>
+          <a:srcRect/>
+          <a:stretch>
+            <a:fillRect/>
+          </a:stretch>
+        </a:blipFill>
+        <a:effectLst/>
+      </p:bgPr>
+    </p:bg>
+    <p:spTree>
+      <p:nvGrpSpPr>
+        <p:cNvPr id="1" name=""/>
+        <p:cNvGrpSpPr/>
+        <p:nvPr/>
+      </p:nvGrpSpPr>
+      <p:grpSpPr>
+        <a:xfrm>
+          <a:off x="0" y="0"/>
+          <a:ext cx="0" cy="0"/>
+          <a:chOff x="0" y="0"/>
+          <a:chExt cx="0" cy="0"/>
+        </a:xfrm>
+      </p:grpSpPr>
+    </p:spTree>
+    <p:extLst>
+      <p:ext uri="{BB962C8B-B14F-4D97-AF65-F5344CB8AC3E}">
+        <p14:creationId xmlns:p14="http://schemas.microsoft.com/office/powerpoint/2010/main" val="3699400433"/>
+      </p:ext>
+    </p:extLst>
+  </p:cSld>
+  <p:clrMapOvr>
+    <a:masterClrMapping/>
+  </p:clrMapOvr>
+</p:sldLayout>
+</file>
+
+<file path=ppt/slideLayouts/slideLayout24.xml><?xml version="1.0" encoding="utf-8"?>
+<p:sldLayout xmlns:a="http://schemas.openxmlformats.org/drawingml/2006/main" xmlns:r="http://schemas.openxmlformats.org/officeDocument/2006/relationships" xmlns:p="http://schemas.openxmlformats.org/presentationml/2006/main" preserve="1" userDrawn="1">
+  <p:cSld name="gebed">
+    <p:bg>
+      <p:bgPr>
+        <a:blipFill dpi="0" rotWithShape="1">
+          <a:blip r:embed="rId2">
+            <a:lum/>
+          </a:blip>
+          <a:srcRect/>
+          <a:stretch>
+            <a:fillRect/>
+          </a:stretch>
+        </a:blipFill>
+        <a:effectLst/>
+      </p:bgPr>
+    </p:bg>
+    <p:spTree>
+      <p:nvGrpSpPr>
+        <p:cNvPr id="1" name=""/>
+        <p:cNvGrpSpPr/>
+        <p:nvPr/>
+      </p:nvGrpSpPr>
+      <p:grpSpPr>
+        <a:xfrm>
+          <a:off x="0" y="0"/>
+          <a:ext cx="0" cy="0"/>
+          <a:chOff x="0" y="0"/>
+          <a:chExt cx="0" cy="0"/>
+        </a:xfrm>
+      </p:grpSpPr>
+    </p:spTree>
+    <p:extLst>
+      <p:ext uri="{BB962C8B-B14F-4D97-AF65-F5344CB8AC3E}">
+        <p14:creationId xmlns:p14="http://schemas.microsoft.com/office/powerpoint/2010/main" val="2643706964"/>
+      </p:ext>
+    </p:extLst>
+  </p:cSld>
+  <p:clrMapOvr>
+    <a:masterClrMapping/>
+  </p:clrMapOvr>
+</p:sldLayout>
+</file>
+
+<file path=ppt/slideLayouts/slideLayout25.xml><?xml version="1.0" encoding="utf-8"?>
+<p:sldLayout xmlns:a="http://schemas.openxmlformats.org/drawingml/2006/main" xmlns:r="http://schemas.openxmlformats.org/officeDocument/2006/relationships" xmlns:p="http://schemas.openxmlformats.org/presentationml/2006/main" preserve="1" userDrawn="1">
+  <p:cSld name="de weg die God wijst">
+    <p:bg>
+      <p:bgPr>
+        <a:blipFill dpi="0" rotWithShape="1">
+          <a:blip r:embed="rId2">
+            <a:lum/>
+          </a:blip>
+          <a:srcRect/>
+          <a:stretch>
+            <a:fillRect/>
+          </a:stretch>
+        </a:blipFill>
+        <a:effectLst/>
+      </p:bgPr>
+    </p:bg>
+    <p:spTree>
+      <p:nvGrpSpPr>
+        <p:cNvPr id="1" name=""/>
+        <p:cNvGrpSpPr/>
+        <p:nvPr/>
+      </p:nvGrpSpPr>
+      <p:grpSpPr>
+        <a:xfrm>
+          <a:off x="0" y="0"/>
+          <a:ext cx="0" cy="0"/>
+          <a:chOff x="0" y="0"/>
+          <a:chExt cx="0" cy="0"/>
+        </a:xfrm>
+      </p:grpSpPr>
+    </p:spTree>
+    <p:extLst>
+      <p:ext uri="{BB962C8B-B14F-4D97-AF65-F5344CB8AC3E}">
+        <p14:creationId xmlns:p14="http://schemas.microsoft.com/office/powerpoint/2010/main" val="2323190717"/>
+      </p:ext>
+    </p:extLst>
+  </p:cSld>
+  <p:clrMapOvr>
+    <a:masterClrMapping/>
+  </p:clrMapOvr>
+</p:sldLayout>
+</file>
+
+<file path=ppt/slideLayouts/slideLayout26.xml><?xml version="1.0" encoding="utf-8"?>
+<p:sldLayout xmlns:a="http://schemas.openxmlformats.org/drawingml/2006/main" xmlns:r="http://schemas.openxmlformats.org/officeDocument/2006/relationships" xmlns:p="http://schemas.openxmlformats.org/presentationml/2006/main" preserve="1" userDrawn="1">
+  <p:cSld name="collecte">
+    <p:bg>
+      <p:bgPr>
+        <a:blipFill dpi="0" rotWithShape="1">
+          <a:blip r:embed="rId2">
+            <a:lum/>
+          </a:blip>
+          <a:srcRect/>
+          <a:stretch>
+            <a:fillRect/>
+          </a:stretch>
+        </a:blipFill>
+        <a:effectLst/>
+      </p:bgPr>
+    </p:bg>
+    <p:spTree>
+      <p:nvGrpSpPr>
+        <p:cNvPr id="1" name=""/>
+        <p:cNvGrpSpPr/>
+        <p:nvPr/>
+      </p:nvGrpSpPr>
+      <p:grpSpPr>
+        <a:xfrm>
+          <a:off x="0" y="0"/>
+          <a:ext cx="0" cy="0"/>
+          <a:chOff x="0" y="0"/>
+          <a:chExt cx="0" cy="0"/>
+        </a:xfrm>
+      </p:grpSpPr>
+    </p:spTree>
+    <p:extLst>
+      <p:ext uri="{BB962C8B-B14F-4D97-AF65-F5344CB8AC3E}">
+        <p14:creationId xmlns:p14="http://schemas.microsoft.com/office/powerpoint/2010/main" val="385434026"/>
+      </p:ext>
+    </p:extLst>
+  </p:cSld>
+  <p:clrMapOvr>
+    <a:masterClrMapping/>
+  </p:clrMapOvr>
+  <p:extLst>
+    <p:ext uri="{DCECCB84-F9BA-43D5-87BE-67443E8EF086}">
+      <p15:sldGuideLst xmlns:p15="http://schemas.microsoft.com/office/powerpoint/2012/main">
+        <p15:guide id="1" orient="horz" pos="2160">
+          <p15:clr>
+            <a:srgbClr val="FBAE40"/>
+          </p15:clr>
+        </p15:guide>
+        <p15:guide id="2" pos="3840">
+          <p15:clr>
+            <a:srgbClr val="FBAE40"/>
+          </p15:clr>
+        </p15:guide>
+      </p15:sldGuideLst>
+    </p:ext>
+  </p:extLst>
+</p:sldLayout>
+</file>
+
+<file path=ppt/slideLayouts/slideLayout27.xml><?xml version="1.0" encoding="utf-8"?>
+<p:sldLayout xmlns:a="http://schemas.openxmlformats.org/drawingml/2006/main" xmlns:r="http://schemas.openxmlformats.org/officeDocument/2006/relationships" xmlns:p="http://schemas.openxmlformats.org/presentationml/2006/main" preserve="1" userDrawn="1">
+  <p:cSld name="extra">
+    <p:bg>
+      <p:bgPr>
+        <a:blipFill dpi="0" rotWithShape="1">
+          <a:blip r:embed="rId2">
+            <a:lum/>
+          </a:blip>
+          <a:srcRect/>
+          <a:stretch>
+            <a:fillRect/>
+          </a:stretch>
+        </a:blipFill>
+        <a:effectLst/>
+      </p:bgPr>
+    </p:bg>
+    <p:spTree>
+      <p:nvGrpSpPr>
+        <p:cNvPr id="1" name=""/>
+        <p:cNvGrpSpPr/>
+        <p:nvPr/>
+      </p:nvGrpSpPr>
+      <p:grpSpPr>
+        <a:xfrm>
+          <a:off x="0" y="0"/>
+          <a:ext cx="0" cy="0"/>
+          <a:chOff x="0" y="0"/>
+          <a:chExt cx="0" cy="0"/>
+        </a:xfrm>
+      </p:grpSpPr>
+    </p:spTree>
+    <p:extLst>
+      <p:ext uri="{BB962C8B-B14F-4D97-AF65-F5344CB8AC3E}">
+        <p14:creationId xmlns:p14="http://schemas.microsoft.com/office/powerpoint/2010/main" val="2116732469"/>
+      </p:ext>
+    </p:extLst>
+  </p:cSld>
+  <p:clrMapOvr>
+    <a:masterClrMapping/>
+  </p:clrMapOvr>
+</p:sldLayout>
+</file>
+
+<file path=ppt/slideLayouts/slideLayout28.xml><?xml version="1.0" encoding="utf-8"?>
+<p:sldLayout xmlns:a="http://schemas.openxmlformats.org/drawingml/2006/main" xmlns:r="http://schemas.openxmlformats.org/officeDocument/2006/relationships" xmlns:p="http://schemas.openxmlformats.org/presentationml/2006/main" userDrawn="1">
+  <p:cSld name="Ondertiteling">
+    <p:bg>
+      <p:bgRef idx="1001">
+        <a:schemeClr val="bg1"/>
+      </p:bgRef>
+    </p:bg>
+    <p:spTree>
+      <p:nvGrpSpPr>
+        <p:cNvPr id="1" name=""/>
+        <p:cNvGrpSpPr/>
+        <p:nvPr/>
+      </p:nvGrpSpPr>
+      <p:grpSpPr>
+        <a:xfrm>
+          <a:off x="0" y="0"/>
+          <a:ext cx="0" cy="0"/>
+          <a:chOff x="0" y="0"/>
+          <a:chExt cx="0" cy="0"/>
+        </a:xfrm>
+      </p:grpSpPr>
+      <p:sp>
+        <p:nvSpPr>
+          <p:cNvPr id="2" name="Titel 1">
+            <a:extLst>
+              <a:ext uri="{FF2B5EF4-FFF2-40B4-BE49-F238E27FC236}">
+                <a16:creationId xmlns:a16="http://schemas.microsoft.com/office/drawing/2014/main" id="{ABF5926B-42F7-3FBD-1708-B8695F41877E}"/>
+              </a:ext>
+            </a:extLst>
+          </p:cNvPr>
+          <p:cNvSpPr>
+            <a:spLocks noGrp="1"/>
+          </p:cNvSpPr>
+          <p:nvPr>
+            <p:ph type="title"/>
+          </p:nvPr>
+        </p:nvSpPr>
+        <p:spPr>
+          <a:xfrm>
+            <a:off x="838200" y="5233458"/>
+            <a:ext cx="10515600" cy="1325563"/>
+          </a:xfrm>
+          <a:prstGeom prst="rect">
+            <a:avLst/>
+          </a:prstGeom>
+        </p:spPr>
+        <p:txBody>
+          <a:bodyPr/>
+          <a:lstStyle>
+            <a:lvl1pPr algn="ctr">
+              <a:defRPr sz="3600" b="1">
+                <a:latin typeface="Arial Nova" panose="020F0502020204030204" pitchFamily="34" charset="0"/>
+              </a:defRPr>
+            </a:lvl1pPr>
+          </a:lstStyle>
+          <a:p>
+            <a:r>
+              <a:rPr lang="nl-NL" dirty="0"/>
+              <a:t>Klik om stijl te bewerken</a:t>
+            </a:r>
+          </a:p>
+        </p:txBody>
+      </p:sp>
+    </p:spTree>
+    <p:extLst>
+      <p:ext uri="{BB962C8B-B14F-4D97-AF65-F5344CB8AC3E}">
+        <p14:creationId xmlns:p14="http://schemas.microsoft.com/office/powerpoint/2010/main" val="1590872200"/>
+      </p:ext>
+    </p:extLst>
+  </p:cSld>
+  <p:clrMapOvr>
+    <a:overrideClrMapping bg1="dk1" tx1="lt1" bg2="dk2" tx2="lt2" accent1="accent1" accent2="accent2" accent3="accent3" accent4="accent4" accent5="accent5" accent6="accent6" hlink="hlink" folHlink="folHlink"/>
+  </p:clrMapOvr>
+</p:sldLayout>
+</file>
+
+<file path=ppt/slideLayouts/slideLayout29.xml><?xml version="1.0" encoding="utf-8"?>
+<p:sldLayout xmlns:a="http://schemas.openxmlformats.org/drawingml/2006/main" xmlns:r="http://schemas.openxmlformats.org/officeDocument/2006/relationships" xmlns:p="http://schemas.openxmlformats.org/presentationml/2006/main" type="blank">
+  <p:cSld name="Leeg">
+    <p:spTree>
+      <p:nvGrpSpPr>
+        <p:cNvPr id="1" name=""/>
+        <p:cNvGrpSpPr/>
+        <p:nvPr/>
+      </p:nvGrpSpPr>
+      <p:grpSpPr>
+        <a:xfrm>
+          <a:off x="0" y="0"/>
+          <a:ext cx="0" cy="0"/>
+          <a:chOff x="0" y="0"/>
+          <a:chExt cx="0" cy="0"/>
+        </a:xfrm>
+      </p:grpSpPr>
+      <p:sp>
+        <p:nvSpPr>
+          <p:cNvPr id="2" name="Rectangle 4">
+            <a:extLst>
+              <a:ext uri="{FF2B5EF4-FFF2-40B4-BE49-F238E27FC236}">
+                <a16:creationId xmlns:a16="http://schemas.microsoft.com/office/drawing/2014/main" id="{2C67F9F6-8E23-59A3-231D-26D0D656EE99}"/>
+              </a:ext>
+            </a:extLst>
+          </p:cNvPr>
+          <p:cNvSpPr>
+            <a:spLocks noGrp="1" noChangeArrowheads="1"/>
+          </p:cNvSpPr>
+          <p:nvPr>
+            <p:ph type="dt" sz="half" idx="10"/>
+          </p:nvPr>
+        </p:nvSpPr>
+        <p:spPr>
+          <a:ln/>
+        </p:spPr>
+        <p:txBody>
+          <a:bodyPr/>
+          <a:lstStyle>
+            <a:lvl1pPr>
+              <a:defRPr/>
+            </a:lvl1pPr>
+          </a:lstStyle>
+          <a:p>
+            <a:pPr>
+              <a:defRPr/>
+            </a:pPr>
+            <a:endParaRPr lang="nl-NL"/>
+          </a:p>
+        </p:txBody>
+      </p:sp>
+      <p:sp>
+        <p:nvSpPr>
+          <p:cNvPr id="3" name="Rectangle 5">
+            <a:extLst>
+              <a:ext uri="{FF2B5EF4-FFF2-40B4-BE49-F238E27FC236}">
+                <a16:creationId xmlns:a16="http://schemas.microsoft.com/office/drawing/2014/main" id="{42F86EDF-7581-87F0-6788-A1C3BD30C801}"/>
+              </a:ext>
+            </a:extLst>
+          </p:cNvPr>
+          <p:cNvSpPr>
+            <a:spLocks noGrp="1" noChangeArrowheads="1"/>
+          </p:cNvSpPr>
+          <p:nvPr>
+            <p:ph type="ftr" sz="quarter" idx="11"/>
+          </p:nvPr>
+        </p:nvSpPr>
+        <p:spPr>
+          <a:ln/>
+        </p:spPr>
+        <p:txBody>
+          <a:bodyPr/>
+          <a:lstStyle>
+            <a:lvl1pPr>
+              <a:defRPr/>
+            </a:lvl1pPr>
+          </a:lstStyle>
+          <a:p>
+            <a:pPr>
+              <a:defRPr/>
+            </a:pPr>
+            <a:endParaRPr lang="nl-NL"/>
+          </a:p>
+        </p:txBody>
+      </p:sp>
+      <p:sp>
+        <p:nvSpPr>
+          <p:cNvPr id="4" name="Rectangle 6">
+            <a:extLst>
+              <a:ext uri="{FF2B5EF4-FFF2-40B4-BE49-F238E27FC236}">
+                <a16:creationId xmlns:a16="http://schemas.microsoft.com/office/drawing/2014/main" id="{8144FA20-9320-BA40-1050-2E78CAEBFBA5}"/>
+              </a:ext>
+            </a:extLst>
+          </p:cNvPr>
+          <p:cNvSpPr>
+            <a:spLocks noGrp="1" noChangeArrowheads="1"/>
+          </p:cNvSpPr>
+          <p:nvPr>
+            <p:ph type="sldNum" sz="quarter" idx="12"/>
+          </p:nvPr>
+        </p:nvSpPr>
+        <p:spPr>
+          <a:ln/>
+        </p:spPr>
+        <p:txBody>
+          <a:bodyPr/>
+          <a:lstStyle>
+            <a:lvl1pPr>
+              <a:defRPr/>
+            </a:lvl1pPr>
+          </a:lstStyle>
+          <a:p>
+            <a:fld id="{BFEFEA57-89F9-AE4C-84E0-C73165B137A0}" type="slidenum">
+              <a:rPr lang="nl-NL" altLang="nl-NL"/>
+              <a:pPr/>
+              <a:t>‹nr.›</a:t>
+            </a:fld>
+            <a:endParaRPr lang="nl-NL" altLang="nl-NL"/>
+          </a:p>
+        </p:txBody>
+      </p:sp>
+    </p:spTree>
+    <p:extLst>
+      <p:ext uri="{BB962C8B-B14F-4D97-AF65-F5344CB8AC3E}">
+        <p14:creationId xmlns:p14="http://schemas.microsoft.com/office/powerpoint/2010/main" val="936043141"/>
       </p:ext>
     </p:extLst>
   </p:cSld>
@@ -4065,14 +6075,14 @@
           </a:ln>
           <a:extLst>
             <a:ext uri="{909E8E84-426E-40dd-AFC4-6F175D3DCCD1}">
-              <a14:hiddenFill xmlns="" xmlns:a14="http://schemas.microsoft.com/office/drawing/2010/main">
+              <a14:hiddenFill xmlns:a14="http://schemas.microsoft.com/office/drawing/2010/main" xmlns="">
                 <a:solidFill>
                   <a:srgbClr val="FFFFFF"/>
                 </a:solidFill>
               </a14:hiddenFill>
             </a:ext>
             <a:ext uri="{91240B29-F687-4f45-9708-019B960494DF}">
-              <a14:hiddenLine xmlns="" xmlns:a14="http://schemas.microsoft.com/office/drawing/2010/main" w="9525">
+              <a14:hiddenLine xmlns:a14="http://schemas.microsoft.com/office/drawing/2010/main" xmlns="" w="9525">
                 <a:solidFill>
                   <a:srgbClr val="000000"/>
                 </a:solidFill>
@@ -4567,6 +6577,79 @@
   </p:cSld>
   <p:clrMapOvr>
     <a:overrideClrMapping bg1="dk1" tx1="lt1" bg2="dk2" tx2="lt2" accent1="accent1" accent2="accent2" accent3="accent3" accent4="accent4" accent5="accent5" accent6="accent6" hlink="hlink" folHlink="folHlink"/>
+  </p:clrMapOvr>
+</p:sldLayout>
+</file>
+
+<file path=ppt/slideLayouts/slideLayout9.xml><?xml version="1.0" encoding="utf-8"?>
+<p:sldLayout xmlns:a="http://schemas.openxmlformats.org/drawingml/2006/main" xmlns:r="http://schemas.openxmlformats.org/officeDocument/2006/relationships" xmlns:p="http://schemas.openxmlformats.org/presentationml/2006/main" preserve="1" userDrawn="1">
+  <p:cSld name="tussendia">
+    <p:bg>
+      <p:bgPr>
+        <a:blipFill dpi="0" rotWithShape="1">
+          <a:blip r:embed="rId2">
+            <a:lum/>
+          </a:blip>
+          <a:srcRect/>
+          <a:stretch>
+            <a:fillRect/>
+          </a:stretch>
+        </a:blipFill>
+        <a:effectLst/>
+      </p:bgPr>
+    </p:bg>
+    <p:spTree>
+      <p:nvGrpSpPr>
+        <p:cNvPr id="1" name=""/>
+        <p:cNvGrpSpPr/>
+        <p:nvPr/>
+      </p:nvGrpSpPr>
+      <p:grpSpPr>
+        <a:xfrm>
+          <a:off x="0" y="0"/>
+          <a:ext cx="0" cy="0"/>
+          <a:chOff x="0" y="0"/>
+          <a:chExt cx="0" cy="0"/>
+        </a:xfrm>
+      </p:grpSpPr>
+      <p:pic>
+        <p:nvPicPr>
+          <p:cNvPr id="3" name="Afbeelding 2">
+            <a:extLst>
+              <a:ext uri="{FF2B5EF4-FFF2-40B4-BE49-F238E27FC236}">
+                <a16:creationId xmlns:a16="http://schemas.microsoft.com/office/drawing/2014/main" id="{D7374831-EEA8-234B-9D96-DEDAFC40B8E7}"/>
+              </a:ext>
+            </a:extLst>
+          </p:cNvPr>
+          <p:cNvPicPr>
+            <a:picLocks noChangeAspect="1"/>
+          </p:cNvPicPr>
+          <p:nvPr userDrawn="1"/>
+        </p:nvPicPr>
+        <p:blipFill>
+          <a:blip r:embed="rId3"/>
+          <a:srcRect/>
+          <a:stretch/>
+        </p:blipFill>
+        <p:spPr>
+          <a:xfrm>
+            <a:off x="0" y="0"/>
+            <a:ext cx="12192000" cy="6858000"/>
+          </a:xfrm>
+          <a:prstGeom prst="rect">
+            <a:avLst/>
+          </a:prstGeom>
+        </p:spPr>
+      </p:pic>
+    </p:spTree>
+    <p:extLst>
+      <p:ext uri="{BB962C8B-B14F-4D97-AF65-F5344CB8AC3E}">
+        <p14:creationId xmlns:p14="http://schemas.microsoft.com/office/powerpoint/2010/main" val="3057548385"/>
+      </p:ext>
+    </p:extLst>
+  </p:cSld>
+  <p:clrMapOvr>
+    <a:masterClrMapping/>
   </p:clrMapOvr>
 </p:sldLayout>
 </file>
@@ -4903,8 +6986,1179 @@
 </p:sldMaster>
 </file>
 
+<file path=ppt/slideMasters/slideMaster2.xml><?xml version="1.0" encoding="utf-8"?>
+<p:sldMaster xmlns:a="http://schemas.openxmlformats.org/drawingml/2006/main" xmlns:r="http://schemas.openxmlformats.org/officeDocument/2006/relationships" xmlns:p="http://schemas.openxmlformats.org/presentationml/2006/main">
+  <p:cSld>
+    <p:bg>
+      <p:bgPr>
+        <a:blipFill dpi="0" rotWithShape="1">
+          <a:blip r:embed="rId23">
+            <a:lum/>
+          </a:blip>
+          <a:srcRect/>
+          <a:stretch>
+            <a:fillRect/>
+          </a:stretch>
+        </a:blipFill>
+        <a:effectLst/>
+      </p:bgPr>
+    </p:bg>
+    <p:spTree>
+      <p:nvGrpSpPr>
+        <p:cNvPr id="1" name=""/>
+        <p:cNvGrpSpPr/>
+        <p:nvPr/>
+      </p:nvGrpSpPr>
+      <p:grpSpPr>
+        <a:xfrm>
+          <a:off x="0" y="0"/>
+          <a:ext cx="0" cy="0"/>
+          <a:chOff x="0" y="0"/>
+          <a:chExt cx="0" cy="0"/>
+        </a:xfrm>
+      </p:grpSpPr>
+      <p:sp>
+        <p:nvSpPr>
+          <p:cNvPr id="7" name="Tekstvak 6">
+            <a:extLst>
+              <a:ext uri="{FF2B5EF4-FFF2-40B4-BE49-F238E27FC236}">
+                <a16:creationId xmlns:a16="http://schemas.microsoft.com/office/drawing/2014/main" id="{88FDAAB6-517C-744E-A478-C497CAA328FE}"/>
+              </a:ext>
+            </a:extLst>
+          </p:cNvPr>
+          <p:cNvSpPr txBox="1">
+            <a:spLocks noChangeArrowheads="1"/>
+          </p:cNvSpPr>
+          <p:nvPr userDrawn="1"/>
+        </p:nvSpPr>
+        <p:spPr bwMode="auto">
+          <a:xfrm>
+            <a:off x="1543945" y="5663279"/>
+            <a:ext cx="5223263" cy="707886"/>
+          </a:xfrm>
+          <a:prstGeom prst="rect">
+            <a:avLst/>
+          </a:prstGeom>
+          <a:noFill/>
+          <a:ln>
+            <a:noFill/>
+          </a:ln>
+          <a:extLst>
+            <a:ext uri="{909E8E84-426E-40dd-AFC4-6F175D3DCCD1}">
+              <a14:hiddenFill xmlns="" xmlns:a14="http://schemas.microsoft.com/office/drawing/2010/main">
+                <a:solidFill>
+                  <a:srgbClr val="FFFFFF"/>
+                </a:solidFill>
+              </a14:hiddenFill>
+            </a:ext>
+            <a:ext uri="{91240B29-F687-4f45-9708-019B960494DF}">
+              <a14:hiddenLine xmlns="" xmlns:a14="http://schemas.microsoft.com/office/drawing/2010/main" w="9525">
+                <a:solidFill>
+                  <a:srgbClr val="000000"/>
+                </a:solidFill>
+                <a:miter lim="800000"/>
+                <a:headEnd/>
+                <a:tailEnd/>
+              </a14:hiddenLine>
+            </a:ext>
+          </a:extLst>
+        </p:spPr>
+        <p:txBody>
+          <a:bodyPr wrap="square">
+            <a:spAutoFit/>
+          </a:bodyPr>
+          <a:lstStyle>
+            <a:lvl1pPr marL="342900" indent="-342900" eaLnBrk="0" hangingPunct="0">
+              <a:tabLst>
+                <a:tab pos="1878013" algn="l"/>
+              </a:tabLst>
+              <a:defRPr sz="5600">
+                <a:solidFill>
+                  <a:srgbClr val="000000"/>
+                </a:solidFill>
+                <a:latin typeface="Gill Sans" charset="0"/>
+                <a:ea typeface="ヒラギノ角ゴ ProN W3" charset="0"/>
+                <a:cs typeface="ヒラギノ角ゴ ProN W3" charset="0"/>
+                <a:sym typeface="Gill Sans" charset="0"/>
+              </a:defRPr>
+            </a:lvl1pPr>
+            <a:lvl2pPr marL="742950" indent="-285750" eaLnBrk="0" hangingPunct="0">
+              <a:tabLst>
+                <a:tab pos="1878013" algn="l"/>
+              </a:tabLst>
+              <a:defRPr sz="5600">
+                <a:solidFill>
+                  <a:srgbClr val="000000"/>
+                </a:solidFill>
+                <a:latin typeface="Gill Sans" charset="0"/>
+                <a:ea typeface="ヒラギノ角ゴ ProN W3" charset="0"/>
+                <a:cs typeface="ヒラギノ角ゴ ProN W3" charset="0"/>
+                <a:sym typeface="Gill Sans" charset="0"/>
+              </a:defRPr>
+            </a:lvl2pPr>
+            <a:lvl3pPr marL="1143000" indent="-228600" eaLnBrk="0" hangingPunct="0">
+              <a:tabLst>
+                <a:tab pos="1878013" algn="l"/>
+              </a:tabLst>
+              <a:defRPr sz="5600">
+                <a:solidFill>
+                  <a:srgbClr val="000000"/>
+                </a:solidFill>
+                <a:latin typeface="Gill Sans" charset="0"/>
+                <a:ea typeface="ヒラギノ角ゴ ProN W3" charset="0"/>
+                <a:cs typeface="ヒラギノ角ゴ ProN W3" charset="0"/>
+                <a:sym typeface="Gill Sans" charset="0"/>
+              </a:defRPr>
+            </a:lvl3pPr>
+            <a:lvl4pPr marL="1600200" indent="-228600" eaLnBrk="0" hangingPunct="0">
+              <a:tabLst>
+                <a:tab pos="1878013" algn="l"/>
+              </a:tabLst>
+              <a:defRPr sz="5600">
+                <a:solidFill>
+                  <a:srgbClr val="000000"/>
+                </a:solidFill>
+                <a:latin typeface="Gill Sans" charset="0"/>
+                <a:ea typeface="ヒラギノ角ゴ ProN W3" charset="0"/>
+                <a:cs typeface="ヒラギノ角ゴ ProN W3" charset="0"/>
+                <a:sym typeface="Gill Sans" charset="0"/>
+              </a:defRPr>
+            </a:lvl4pPr>
+            <a:lvl5pPr marL="2057400" indent="-228600" eaLnBrk="0" hangingPunct="0">
+              <a:tabLst>
+                <a:tab pos="1878013" algn="l"/>
+              </a:tabLst>
+              <a:defRPr sz="5600">
+                <a:solidFill>
+                  <a:srgbClr val="000000"/>
+                </a:solidFill>
+                <a:latin typeface="Gill Sans" charset="0"/>
+                <a:ea typeface="ヒラギノ角ゴ ProN W3" charset="0"/>
+                <a:cs typeface="ヒラギノ角ゴ ProN W3" charset="0"/>
+                <a:sym typeface="Gill Sans" charset="0"/>
+              </a:defRPr>
+            </a:lvl5pPr>
+            <a:lvl6pPr marL="2514600" indent="-228600" algn="ctr" eaLnBrk="0" fontAlgn="base" hangingPunct="0">
+              <a:spcBef>
+                <a:spcPct val="0"/>
+              </a:spcBef>
+              <a:spcAft>
+                <a:spcPct val="0"/>
+              </a:spcAft>
+              <a:tabLst>
+                <a:tab pos="1878013" algn="l"/>
+              </a:tabLst>
+              <a:defRPr sz="5600">
+                <a:solidFill>
+                  <a:srgbClr val="000000"/>
+                </a:solidFill>
+                <a:latin typeface="Gill Sans" charset="0"/>
+                <a:ea typeface="ヒラギノ角ゴ ProN W3" charset="0"/>
+                <a:cs typeface="ヒラギノ角ゴ ProN W3" charset="0"/>
+                <a:sym typeface="Gill Sans" charset="0"/>
+              </a:defRPr>
+            </a:lvl6pPr>
+            <a:lvl7pPr marL="2971800" indent="-228600" algn="ctr" eaLnBrk="0" fontAlgn="base" hangingPunct="0">
+              <a:spcBef>
+                <a:spcPct val="0"/>
+              </a:spcBef>
+              <a:spcAft>
+                <a:spcPct val="0"/>
+              </a:spcAft>
+              <a:tabLst>
+                <a:tab pos="1878013" algn="l"/>
+              </a:tabLst>
+              <a:defRPr sz="5600">
+                <a:solidFill>
+                  <a:srgbClr val="000000"/>
+                </a:solidFill>
+                <a:latin typeface="Gill Sans" charset="0"/>
+                <a:ea typeface="ヒラギノ角ゴ ProN W3" charset="0"/>
+                <a:cs typeface="ヒラギノ角ゴ ProN W3" charset="0"/>
+                <a:sym typeface="Gill Sans" charset="0"/>
+              </a:defRPr>
+            </a:lvl7pPr>
+            <a:lvl8pPr marL="3429000" indent="-228600" algn="ctr" eaLnBrk="0" fontAlgn="base" hangingPunct="0">
+              <a:spcBef>
+                <a:spcPct val="0"/>
+              </a:spcBef>
+              <a:spcAft>
+                <a:spcPct val="0"/>
+              </a:spcAft>
+              <a:tabLst>
+                <a:tab pos="1878013" algn="l"/>
+              </a:tabLst>
+              <a:defRPr sz="5600">
+                <a:solidFill>
+                  <a:srgbClr val="000000"/>
+                </a:solidFill>
+                <a:latin typeface="Gill Sans" charset="0"/>
+                <a:ea typeface="ヒラギノ角ゴ ProN W3" charset="0"/>
+                <a:cs typeface="ヒラギノ角ゴ ProN W3" charset="0"/>
+                <a:sym typeface="Gill Sans" charset="0"/>
+              </a:defRPr>
+            </a:lvl8pPr>
+            <a:lvl9pPr marL="3886200" indent="-228600" algn="ctr" eaLnBrk="0" fontAlgn="base" hangingPunct="0">
+              <a:spcBef>
+                <a:spcPct val="0"/>
+              </a:spcBef>
+              <a:spcAft>
+                <a:spcPct val="0"/>
+              </a:spcAft>
+              <a:tabLst>
+                <a:tab pos="1878013" algn="l"/>
+              </a:tabLst>
+              <a:defRPr sz="5600">
+                <a:solidFill>
+                  <a:srgbClr val="000000"/>
+                </a:solidFill>
+                <a:latin typeface="Gill Sans" charset="0"/>
+                <a:ea typeface="ヒラギノ角ゴ ProN W3" charset="0"/>
+                <a:cs typeface="ヒラギノ角ゴ ProN W3" charset="0"/>
+                <a:sym typeface="Gill Sans" charset="0"/>
+              </a:defRPr>
+            </a:lvl9pPr>
+          </a:lstStyle>
+          <a:p>
+            <a:r>
+              <a:rPr lang="nl-NL" sz="2000" i="1" dirty="0">
+                <a:solidFill>
+                  <a:schemeClr val="bg1"/>
+                </a:solidFill>
+                <a:effectLst>
+                  <a:outerShdw blurRad="50800" dist="38100" dir="2700000" algn="tl" rotWithShape="0">
+                    <a:prstClr val="black">
+                      <a:alpha val="40000"/>
+                    </a:prstClr>
+                  </a:outerShdw>
+                </a:effectLst>
+                <a:latin typeface="Century Gothic"/>
+                <a:cs typeface="Century Gothic"/>
+              </a:rPr>
+              <a:t>Tussen Pasen</a:t>
+            </a:r>
+          </a:p>
+          <a:p>
+            <a:r>
+              <a:rPr lang="nl-NL" sz="2000" i="1" dirty="0">
+                <a:solidFill>
+                  <a:schemeClr val="bg1"/>
+                </a:solidFill>
+                <a:effectLst>
+                  <a:outerShdw blurRad="50800" dist="38100" dir="2700000" algn="tl" rotWithShape="0">
+                    <a:prstClr val="black">
+                      <a:alpha val="40000"/>
+                    </a:prstClr>
+                  </a:outerShdw>
+                </a:effectLst>
+                <a:latin typeface="Century Gothic"/>
+                <a:cs typeface="Century Gothic"/>
+              </a:rPr>
+              <a:t>en Pinksteren</a:t>
+            </a:r>
+          </a:p>
+        </p:txBody>
+      </p:sp>
+    </p:spTree>
+    <p:extLst>
+      <p:ext uri="{BB962C8B-B14F-4D97-AF65-F5344CB8AC3E}">
+        <p14:creationId xmlns:p14="http://schemas.microsoft.com/office/powerpoint/2010/main" val="1157822402"/>
+      </p:ext>
+    </p:extLst>
+  </p:cSld>
+  <p:clrMap bg1="lt1" tx1="dk1" bg2="lt2" tx2="dk2" accent1="accent1" accent2="accent2" accent3="accent3" accent4="accent4" accent5="accent5" accent6="accent6" hlink="hlink" folHlink="folHlink"/>
+  <p:sldLayoutIdLst>
+    <p:sldLayoutId id="2147483683" r:id="rId1"/>
+    <p:sldLayoutId id="2147483684" r:id="rId2"/>
+    <p:sldLayoutId id="2147483685" r:id="rId3"/>
+    <p:sldLayoutId id="2147483686" r:id="rId4"/>
+    <p:sldLayoutId id="2147483687" r:id="rId5"/>
+    <p:sldLayoutId id="2147483688" r:id="rId6"/>
+    <p:sldLayoutId id="2147483689" r:id="rId7"/>
+    <p:sldLayoutId id="2147483690" r:id="rId8"/>
+    <p:sldLayoutId id="2147483691" r:id="rId9"/>
+    <p:sldLayoutId id="2147483692" r:id="rId10"/>
+    <p:sldLayoutId id="2147483693" r:id="rId11"/>
+    <p:sldLayoutId id="2147483694" r:id="rId12"/>
+    <p:sldLayoutId id="2147483695" r:id="rId13"/>
+    <p:sldLayoutId id="2147483696" r:id="rId14"/>
+    <p:sldLayoutId id="2147483697" r:id="rId15"/>
+    <p:sldLayoutId id="2147483698" r:id="rId16"/>
+    <p:sldLayoutId id="2147483699" r:id="rId17"/>
+    <p:sldLayoutId id="2147483700" r:id="rId18"/>
+    <p:sldLayoutId id="2147483701" r:id="rId19"/>
+    <p:sldLayoutId id="2147483702" r:id="rId20"/>
+    <p:sldLayoutId id="2147483703" r:id="rId21"/>
+  </p:sldLayoutIdLst>
+  <p:txStyles>
+    <p:titleStyle>
+      <a:lvl1pPr algn="l" defTabSz="914400" rtl="0" eaLnBrk="1" latinLnBrk="0" hangingPunct="1">
+        <a:lnSpc>
+          <a:spcPct val="90000"/>
+        </a:lnSpc>
+        <a:spcBef>
+          <a:spcPct val="0"/>
+        </a:spcBef>
+        <a:buNone/>
+        <a:defRPr sz="4400" kern="1200">
+          <a:solidFill>
+            <a:schemeClr val="tx1"/>
+          </a:solidFill>
+          <a:latin typeface="+mj-lt"/>
+          <a:ea typeface="+mj-ea"/>
+          <a:cs typeface="+mj-cs"/>
+        </a:defRPr>
+      </a:lvl1pPr>
+    </p:titleStyle>
+    <p:bodyStyle>
+      <a:lvl1pPr marL="228600" indent="-228600" algn="l" defTabSz="914400" rtl="0" eaLnBrk="1" latinLnBrk="0" hangingPunct="1">
+        <a:lnSpc>
+          <a:spcPct val="90000"/>
+        </a:lnSpc>
+        <a:spcBef>
+          <a:spcPts val="1000"/>
+        </a:spcBef>
+        <a:buFont typeface="Arial" panose="020B0604020202020204" pitchFamily="34" charset="0"/>
+        <a:buChar char="•"/>
+        <a:defRPr sz="2800" kern="1200">
+          <a:solidFill>
+            <a:schemeClr val="tx1"/>
+          </a:solidFill>
+          <a:latin typeface="+mn-lt"/>
+          <a:ea typeface="+mn-ea"/>
+          <a:cs typeface="+mn-cs"/>
+        </a:defRPr>
+      </a:lvl1pPr>
+      <a:lvl2pPr marL="685800" indent="-228600" algn="l" defTabSz="914400" rtl="0" eaLnBrk="1" latinLnBrk="0" hangingPunct="1">
+        <a:lnSpc>
+          <a:spcPct val="90000"/>
+        </a:lnSpc>
+        <a:spcBef>
+          <a:spcPts val="500"/>
+        </a:spcBef>
+        <a:buFont typeface="Arial" panose="020B0604020202020204" pitchFamily="34" charset="0"/>
+        <a:buChar char="•"/>
+        <a:defRPr sz="2400" kern="1200">
+          <a:solidFill>
+            <a:schemeClr val="tx1"/>
+          </a:solidFill>
+          <a:latin typeface="+mn-lt"/>
+          <a:ea typeface="+mn-ea"/>
+          <a:cs typeface="+mn-cs"/>
+        </a:defRPr>
+      </a:lvl2pPr>
+      <a:lvl3pPr marL="1143000" indent="-228600" algn="l" defTabSz="914400" rtl="0" eaLnBrk="1" latinLnBrk="0" hangingPunct="1">
+        <a:lnSpc>
+          <a:spcPct val="90000"/>
+        </a:lnSpc>
+        <a:spcBef>
+          <a:spcPts val="500"/>
+        </a:spcBef>
+        <a:buFont typeface="Arial" panose="020B0604020202020204" pitchFamily="34" charset="0"/>
+        <a:buChar char="•"/>
+        <a:defRPr sz="2000" kern="1200">
+          <a:solidFill>
+            <a:schemeClr val="tx1"/>
+          </a:solidFill>
+          <a:latin typeface="+mn-lt"/>
+          <a:ea typeface="+mn-ea"/>
+          <a:cs typeface="+mn-cs"/>
+        </a:defRPr>
+      </a:lvl3pPr>
+      <a:lvl4pPr marL="1600200" indent="-228600" algn="l" defTabSz="914400" rtl="0" eaLnBrk="1" latinLnBrk="0" hangingPunct="1">
+        <a:lnSpc>
+          <a:spcPct val="90000"/>
+        </a:lnSpc>
+        <a:spcBef>
+          <a:spcPts val="500"/>
+        </a:spcBef>
+        <a:buFont typeface="Arial" panose="020B0604020202020204" pitchFamily="34" charset="0"/>
+        <a:buChar char="•"/>
+        <a:defRPr sz="1800" kern="1200">
+          <a:solidFill>
+            <a:schemeClr val="tx1"/>
+          </a:solidFill>
+          <a:latin typeface="+mn-lt"/>
+          <a:ea typeface="+mn-ea"/>
+          <a:cs typeface="+mn-cs"/>
+        </a:defRPr>
+      </a:lvl4pPr>
+      <a:lvl5pPr marL="2057400" indent="-228600" algn="l" defTabSz="914400" rtl="0" eaLnBrk="1" latinLnBrk="0" hangingPunct="1">
+        <a:lnSpc>
+          <a:spcPct val="90000"/>
+        </a:lnSpc>
+        <a:spcBef>
+          <a:spcPts val="500"/>
+        </a:spcBef>
+        <a:buFont typeface="Arial" panose="020B0604020202020204" pitchFamily="34" charset="0"/>
+        <a:buChar char="•"/>
+        <a:defRPr sz="1800" kern="1200">
+          <a:solidFill>
+            <a:schemeClr val="tx1"/>
+          </a:solidFill>
+          <a:latin typeface="+mn-lt"/>
+          <a:ea typeface="+mn-ea"/>
+          <a:cs typeface="+mn-cs"/>
+        </a:defRPr>
+      </a:lvl5pPr>
+      <a:lvl6pPr marL="2514600" indent="-228600" algn="l" defTabSz="914400" rtl="0" eaLnBrk="1" latinLnBrk="0" hangingPunct="1">
+        <a:lnSpc>
+          <a:spcPct val="90000"/>
+        </a:lnSpc>
+        <a:spcBef>
+          <a:spcPts val="500"/>
+        </a:spcBef>
+        <a:buFont typeface="Arial" panose="020B0604020202020204" pitchFamily="34" charset="0"/>
+        <a:buChar char="•"/>
+        <a:defRPr sz="1800" kern="1200">
+          <a:solidFill>
+            <a:schemeClr val="tx1"/>
+          </a:solidFill>
+          <a:latin typeface="+mn-lt"/>
+          <a:ea typeface="+mn-ea"/>
+          <a:cs typeface="+mn-cs"/>
+        </a:defRPr>
+      </a:lvl6pPr>
+      <a:lvl7pPr marL="2971800" indent="-228600" algn="l" defTabSz="914400" rtl="0" eaLnBrk="1" latinLnBrk="0" hangingPunct="1">
+        <a:lnSpc>
+          <a:spcPct val="90000"/>
+        </a:lnSpc>
+        <a:spcBef>
+          <a:spcPts val="500"/>
+        </a:spcBef>
+        <a:buFont typeface="Arial" panose="020B0604020202020204" pitchFamily="34" charset="0"/>
+        <a:buChar char="•"/>
+        <a:defRPr sz="1800" kern="1200">
+          <a:solidFill>
+            <a:schemeClr val="tx1"/>
+          </a:solidFill>
+          <a:latin typeface="+mn-lt"/>
+          <a:ea typeface="+mn-ea"/>
+          <a:cs typeface="+mn-cs"/>
+        </a:defRPr>
+      </a:lvl7pPr>
+      <a:lvl8pPr marL="3429000" indent="-228600" algn="l" defTabSz="914400" rtl="0" eaLnBrk="1" latinLnBrk="0" hangingPunct="1">
+        <a:lnSpc>
+          <a:spcPct val="90000"/>
+        </a:lnSpc>
+        <a:spcBef>
+          <a:spcPts val="500"/>
+        </a:spcBef>
+        <a:buFont typeface="Arial" panose="020B0604020202020204" pitchFamily="34" charset="0"/>
+        <a:buChar char="•"/>
+        <a:defRPr sz="1800" kern="1200">
+          <a:solidFill>
+            <a:schemeClr val="tx1"/>
+          </a:solidFill>
+          <a:latin typeface="+mn-lt"/>
+          <a:ea typeface="+mn-ea"/>
+          <a:cs typeface="+mn-cs"/>
+        </a:defRPr>
+      </a:lvl8pPr>
+      <a:lvl9pPr marL="3886200" indent="-228600" algn="l" defTabSz="914400" rtl="0" eaLnBrk="1" latinLnBrk="0" hangingPunct="1">
+        <a:lnSpc>
+          <a:spcPct val="90000"/>
+        </a:lnSpc>
+        <a:spcBef>
+          <a:spcPts val="500"/>
+        </a:spcBef>
+        <a:buFont typeface="Arial" panose="020B0604020202020204" pitchFamily="34" charset="0"/>
+        <a:buChar char="•"/>
+        <a:defRPr sz="1800" kern="1200">
+          <a:solidFill>
+            <a:schemeClr val="tx1"/>
+          </a:solidFill>
+          <a:latin typeface="+mn-lt"/>
+          <a:ea typeface="+mn-ea"/>
+          <a:cs typeface="+mn-cs"/>
+        </a:defRPr>
+      </a:lvl9pPr>
+    </p:bodyStyle>
+    <p:otherStyle>
+      <a:defPPr>
+        <a:defRPr lang="nl-NL"/>
+      </a:defPPr>
+      <a:lvl1pPr marL="0" algn="l" defTabSz="914400" rtl="0" eaLnBrk="1" latinLnBrk="0" hangingPunct="1">
+        <a:defRPr sz="1800" kern="1200">
+          <a:solidFill>
+            <a:schemeClr val="tx1"/>
+          </a:solidFill>
+          <a:latin typeface="+mn-lt"/>
+          <a:ea typeface="+mn-ea"/>
+          <a:cs typeface="+mn-cs"/>
+        </a:defRPr>
+      </a:lvl1pPr>
+      <a:lvl2pPr marL="457200" algn="l" defTabSz="914400" rtl="0" eaLnBrk="1" latinLnBrk="0" hangingPunct="1">
+        <a:defRPr sz="1800" kern="1200">
+          <a:solidFill>
+            <a:schemeClr val="tx1"/>
+          </a:solidFill>
+          <a:latin typeface="+mn-lt"/>
+          <a:ea typeface="+mn-ea"/>
+          <a:cs typeface="+mn-cs"/>
+        </a:defRPr>
+      </a:lvl2pPr>
+      <a:lvl3pPr marL="914400" algn="l" defTabSz="914400" rtl="0" eaLnBrk="1" latinLnBrk="0" hangingPunct="1">
+        <a:defRPr sz="1800" kern="1200">
+          <a:solidFill>
+            <a:schemeClr val="tx1"/>
+          </a:solidFill>
+          <a:latin typeface="+mn-lt"/>
+          <a:ea typeface="+mn-ea"/>
+          <a:cs typeface="+mn-cs"/>
+        </a:defRPr>
+      </a:lvl3pPr>
+      <a:lvl4pPr marL="1371600" algn="l" defTabSz="914400" rtl="0" eaLnBrk="1" latinLnBrk="0" hangingPunct="1">
+        <a:defRPr sz="1800" kern="1200">
+          <a:solidFill>
+            <a:schemeClr val="tx1"/>
+          </a:solidFill>
+          <a:latin typeface="+mn-lt"/>
+          <a:ea typeface="+mn-ea"/>
+          <a:cs typeface="+mn-cs"/>
+        </a:defRPr>
+      </a:lvl4pPr>
+      <a:lvl5pPr marL="1828800" algn="l" defTabSz="914400" rtl="0" eaLnBrk="1" latinLnBrk="0" hangingPunct="1">
+        <a:defRPr sz="1800" kern="1200">
+          <a:solidFill>
+            <a:schemeClr val="tx1"/>
+          </a:solidFill>
+          <a:latin typeface="+mn-lt"/>
+          <a:ea typeface="+mn-ea"/>
+          <a:cs typeface="+mn-cs"/>
+        </a:defRPr>
+      </a:lvl5pPr>
+      <a:lvl6pPr marL="2286000" algn="l" defTabSz="914400" rtl="0" eaLnBrk="1" latinLnBrk="0" hangingPunct="1">
+        <a:defRPr sz="1800" kern="1200">
+          <a:solidFill>
+            <a:schemeClr val="tx1"/>
+          </a:solidFill>
+          <a:latin typeface="+mn-lt"/>
+          <a:ea typeface="+mn-ea"/>
+          <a:cs typeface="+mn-cs"/>
+        </a:defRPr>
+      </a:lvl6pPr>
+      <a:lvl7pPr marL="2743200" algn="l" defTabSz="914400" rtl="0" eaLnBrk="1" latinLnBrk="0" hangingPunct="1">
+        <a:defRPr sz="1800" kern="1200">
+          <a:solidFill>
+            <a:schemeClr val="tx1"/>
+          </a:solidFill>
+          <a:latin typeface="+mn-lt"/>
+          <a:ea typeface="+mn-ea"/>
+          <a:cs typeface="+mn-cs"/>
+        </a:defRPr>
+      </a:lvl7pPr>
+      <a:lvl8pPr marL="3200400" algn="l" defTabSz="914400" rtl="0" eaLnBrk="1" latinLnBrk="0" hangingPunct="1">
+        <a:defRPr sz="1800" kern="1200">
+          <a:solidFill>
+            <a:schemeClr val="tx1"/>
+          </a:solidFill>
+          <a:latin typeface="+mn-lt"/>
+          <a:ea typeface="+mn-ea"/>
+          <a:cs typeface="+mn-cs"/>
+        </a:defRPr>
+      </a:lvl8pPr>
+      <a:lvl9pPr marL="3657600" algn="l" defTabSz="914400" rtl="0" eaLnBrk="1" latinLnBrk="0" hangingPunct="1">
+        <a:defRPr sz="1800" kern="1200">
+          <a:solidFill>
+            <a:schemeClr val="tx1"/>
+          </a:solidFill>
+          <a:latin typeface="+mn-lt"/>
+          <a:ea typeface="+mn-ea"/>
+          <a:cs typeface="+mn-cs"/>
+        </a:defRPr>
+      </a:lvl9pPr>
+    </p:otherStyle>
+  </p:txStyles>
+</p:sldMaster>
+</file>
+
 <file path=ppt/slides/slide1.xml><?xml version="1.0" encoding="utf-8"?>
-<p:sld xmlns:a16="http://schemas.microsoft.com/office/drawing/2014/main" xmlns:p14="http://schemas.microsoft.com/office/powerpoint/2010/main" xmlns:a="http://schemas.openxmlformats.org/drawingml/2006/main" xmlns:r="http://schemas.openxmlformats.org/officeDocument/2006/relationships" xmlns:p="http://schemas.openxmlformats.org/presentationml/2006/main">
+<p:sld xmlns:a="http://schemas.openxmlformats.org/drawingml/2006/main" xmlns:r="http://schemas.openxmlformats.org/officeDocument/2006/relationships" xmlns:p="http://schemas.openxmlformats.org/presentationml/2006/main" showMasterSp="0">
+  <p:cSld>
+    <p:bg>
+      <p:bgPr>
+        <a:solidFill>
+          <a:schemeClr val="tx1"/>
+        </a:solidFill>
+        <a:effectLst/>
+      </p:bgPr>
+    </p:bg>
+    <p:spTree>
+      <p:nvGrpSpPr>
+        <p:cNvPr id="1" name="">
+          <a:extLst>
+            <a:ext uri="{FF2B5EF4-FFF2-40B4-BE49-F238E27FC236}">
+              <a16:creationId xmlns:a16="http://schemas.microsoft.com/office/drawing/2014/main" id="{25C5E253-71AD-1DCC-FD78-63BCAB52DD44}"/>
+            </a:ext>
+          </a:extLst>
+        </p:cNvPr>
+        <p:cNvGrpSpPr/>
+        <p:nvPr/>
+      </p:nvGrpSpPr>
+      <p:grpSpPr>
+        <a:xfrm>
+          <a:off x="0" y="0"/>
+          <a:ext cx="0" cy="0"/>
+          <a:chOff x="0" y="0"/>
+          <a:chExt cx="0" cy="0"/>
+        </a:xfrm>
+      </p:grpSpPr>
+      <p:sp>
+        <p:nvSpPr>
+          <p:cNvPr id="2" name="Tekstvak 1">
+            <a:extLst>
+              <a:ext uri="{FF2B5EF4-FFF2-40B4-BE49-F238E27FC236}">
+                <a16:creationId xmlns:a16="http://schemas.microsoft.com/office/drawing/2014/main" id="{D5B8D6AC-28D2-21BD-CAFA-90F1CD7CDB65}"/>
+              </a:ext>
+            </a:extLst>
+          </p:cNvPr>
+          <p:cNvSpPr txBox="1">
+            <a:spLocks noChangeArrowheads="1"/>
+          </p:cNvSpPr>
+          <p:nvPr/>
+        </p:nvSpPr>
+        <p:spPr bwMode="auto">
+          <a:xfrm>
+            <a:off x="2881312" y="1460929"/>
+            <a:ext cx="6429375" cy="1160318"/>
+          </a:xfrm>
+          <a:prstGeom prst="rect">
+            <a:avLst/>
+          </a:prstGeom>
+          <a:noFill/>
+          <a:ln>
+            <a:noFill/>
+          </a:ln>
+          <a:extLst>
+            <a:ext uri="{909E8E84-426E-40dd-AFC4-6F175D3DCCD1}">
+              <a14:hiddenFill xmlns:a14="http://schemas.microsoft.com/office/drawing/2010/main" xmlns="">
+                <a:solidFill>
+                  <a:srgbClr val="FFFFFF"/>
+                </a:solidFill>
+              </a14:hiddenFill>
+            </a:ext>
+            <a:ext uri="{91240B29-F687-4f45-9708-019B960494DF}">
+              <a14:hiddenLine xmlns:a14="http://schemas.microsoft.com/office/drawing/2010/main" xmlns="" w="9525">
+                <a:solidFill>
+                  <a:srgbClr val="000000"/>
+                </a:solidFill>
+                <a:miter lim="800000"/>
+                <a:headEnd/>
+                <a:tailEnd/>
+              </a14:hiddenLine>
+            </a:ext>
+          </a:extLst>
+        </p:spPr>
+        <p:txBody>
+          <a:bodyPr>
+            <a:spAutoFit/>
+          </a:bodyPr>
+          <a:lstStyle>
+            <a:lvl1pPr marL="342900" indent="-342900" eaLnBrk="0" hangingPunct="0">
+              <a:tabLst>
+                <a:tab pos="1878013" algn="l"/>
+              </a:tabLst>
+              <a:defRPr sz="5600">
+                <a:solidFill>
+                  <a:srgbClr val="000000"/>
+                </a:solidFill>
+                <a:latin typeface="Gill Sans" charset="0"/>
+                <a:ea typeface="ヒラギノ角ゴ ProN W3" charset="0"/>
+                <a:cs typeface="ヒラギノ角ゴ ProN W3" charset="0"/>
+                <a:sym typeface="Gill Sans" charset="0"/>
+              </a:defRPr>
+            </a:lvl1pPr>
+            <a:lvl2pPr marL="742950" indent="-285750" eaLnBrk="0" hangingPunct="0">
+              <a:tabLst>
+                <a:tab pos="1878013" algn="l"/>
+              </a:tabLst>
+              <a:defRPr sz="5600">
+                <a:solidFill>
+                  <a:srgbClr val="000000"/>
+                </a:solidFill>
+                <a:latin typeface="Gill Sans" charset="0"/>
+                <a:ea typeface="ヒラギノ角ゴ ProN W3" charset="0"/>
+                <a:cs typeface="ヒラギノ角ゴ ProN W3" charset="0"/>
+                <a:sym typeface="Gill Sans" charset="0"/>
+              </a:defRPr>
+            </a:lvl2pPr>
+            <a:lvl3pPr marL="1143000" indent="-228600" eaLnBrk="0" hangingPunct="0">
+              <a:tabLst>
+                <a:tab pos="1878013" algn="l"/>
+              </a:tabLst>
+              <a:defRPr sz="5600">
+                <a:solidFill>
+                  <a:srgbClr val="000000"/>
+                </a:solidFill>
+                <a:latin typeface="Gill Sans" charset="0"/>
+                <a:ea typeface="ヒラギノ角ゴ ProN W3" charset="0"/>
+                <a:cs typeface="ヒラギノ角ゴ ProN W3" charset="0"/>
+                <a:sym typeface="Gill Sans" charset="0"/>
+              </a:defRPr>
+            </a:lvl3pPr>
+            <a:lvl4pPr marL="1600200" indent="-228600" eaLnBrk="0" hangingPunct="0">
+              <a:tabLst>
+                <a:tab pos="1878013" algn="l"/>
+              </a:tabLst>
+              <a:defRPr sz="5600">
+                <a:solidFill>
+                  <a:srgbClr val="000000"/>
+                </a:solidFill>
+                <a:latin typeface="Gill Sans" charset="0"/>
+                <a:ea typeface="ヒラギノ角ゴ ProN W3" charset="0"/>
+                <a:cs typeface="ヒラギノ角ゴ ProN W3" charset="0"/>
+                <a:sym typeface="Gill Sans" charset="0"/>
+              </a:defRPr>
+            </a:lvl4pPr>
+            <a:lvl5pPr marL="2057400" indent="-228600" eaLnBrk="0" hangingPunct="0">
+              <a:tabLst>
+                <a:tab pos="1878013" algn="l"/>
+              </a:tabLst>
+              <a:defRPr sz="5600">
+                <a:solidFill>
+                  <a:srgbClr val="000000"/>
+                </a:solidFill>
+                <a:latin typeface="Gill Sans" charset="0"/>
+                <a:ea typeface="ヒラギノ角ゴ ProN W3" charset="0"/>
+                <a:cs typeface="ヒラギノ角ゴ ProN W3" charset="0"/>
+                <a:sym typeface="Gill Sans" charset="0"/>
+              </a:defRPr>
+            </a:lvl5pPr>
+            <a:lvl6pPr marL="2514600" indent="-228600" algn="ctr" eaLnBrk="0" fontAlgn="base" hangingPunct="0">
+              <a:spcBef>
+                <a:spcPct val="0"/>
+              </a:spcBef>
+              <a:spcAft>
+                <a:spcPct val="0"/>
+              </a:spcAft>
+              <a:tabLst>
+                <a:tab pos="1878013" algn="l"/>
+              </a:tabLst>
+              <a:defRPr sz="5600">
+                <a:solidFill>
+                  <a:srgbClr val="000000"/>
+                </a:solidFill>
+                <a:latin typeface="Gill Sans" charset="0"/>
+                <a:ea typeface="ヒラギノ角ゴ ProN W3" charset="0"/>
+                <a:cs typeface="ヒラギノ角ゴ ProN W3" charset="0"/>
+                <a:sym typeface="Gill Sans" charset="0"/>
+              </a:defRPr>
+            </a:lvl6pPr>
+            <a:lvl7pPr marL="2971800" indent="-228600" algn="ctr" eaLnBrk="0" fontAlgn="base" hangingPunct="0">
+              <a:spcBef>
+                <a:spcPct val="0"/>
+              </a:spcBef>
+              <a:spcAft>
+                <a:spcPct val="0"/>
+              </a:spcAft>
+              <a:tabLst>
+                <a:tab pos="1878013" algn="l"/>
+              </a:tabLst>
+              <a:defRPr sz="5600">
+                <a:solidFill>
+                  <a:srgbClr val="000000"/>
+                </a:solidFill>
+                <a:latin typeface="Gill Sans" charset="0"/>
+                <a:ea typeface="ヒラギノ角ゴ ProN W3" charset="0"/>
+                <a:cs typeface="ヒラギノ角ゴ ProN W3" charset="0"/>
+                <a:sym typeface="Gill Sans" charset="0"/>
+              </a:defRPr>
+            </a:lvl7pPr>
+            <a:lvl8pPr marL="3429000" indent="-228600" algn="ctr" eaLnBrk="0" fontAlgn="base" hangingPunct="0">
+              <a:spcBef>
+                <a:spcPct val="0"/>
+              </a:spcBef>
+              <a:spcAft>
+                <a:spcPct val="0"/>
+              </a:spcAft>
+              <a:tabLst>
+                <a:tab pos="1878013" algn="l"/>
+              </a:tabLst>
+              <a:defRPr sz="5600">
+                <a:solidFill>
+                  <a:srgbClr val="000000"/>
+                </a:solidFill>
+                <a:latin typeface="Gill Sans" charset="0"/>
+                <a:ea typeface="ヒラギノ角ゴ ProN W3" charset="0"/>
+                <a:cs typeface="ヒラギノ角ゴ ProN W3" charset="0"/>
+                <a:sym typeface="Gill Sans" charset="0"/>
+              </a:defRPr>
+            </a:lvl8pPr>
+            <a:lvl9pPr marL="3886200" indent="-228600" algn="ctr" eaLnBrk="0" fontAlgn="base" hangingPunct="0">
+              <a:spcBef>
+                <a:spcPct val="0"/>
+              </a:spcBef>
+              <a:spcAft>
+                <a:spcPct val="0"/>
+              </a:spcAft>
+              <a:tabLst>
+                <a:tab pos="1878013" algn="l"/>
+              </a:tabLst>
+              <a:defRPr sz="5600">
+                <a:solidFill>
+                  <a:srgbClr val="000000"/>
+                </a:solidFill>
+                <a:latin typeface="Gill Sans" charset="0"/>
+                <a:ea typeface="ヒラギノ角ゴ ProN W3" charset="0"/>
+                <a:cs typeface="ヒラギノ角ゴ ProN W3" charset="0"/>
+                <a:sym typeface="Gill Sans" charset="0"/>
+              </a:defRPr>
+            </a:lvl9pPr>
+          </a:lstStyle>
+          <a:p>
+            <a:pPr marL="342900" marR="0" lvl="0" indent="-342900" algn="ctr" defTabSz="914400" rtl="0" eaLnBrk="0" fontAlgn="auto" latinLnBrk="0" hangingPunct="0">
+              <a:lnSpc>
+                <a:spcPct val="130000"/>
+              </a:lnSpc>
+              <a:spcBef>
+                <a:spcPts val="0"/>
+              </a:spcBef>
+              <a:spcAft>
+                <a:spcPts val="0"/>
+              </a:spcAft>
+              <a:buClrTx/>
+              <a:buSzTx/>
+              <a:buFontTx/>
+              <a:buNone/>
+              <a:tabLst>
+                <a:tab pos="1878013" algn="l"/>
+              </a:tabLst>
+              <a:defRPr/>
+            </a:pPr>
+            <a:r>
+              <a:rPr kumimoji="0" lang="nl-NL" sz="6000" b="1" i="0" u="none" strike="noStrike" kern="1200" cap="none" spc="0" normalizeH="0" baseline="0" noProof="0" dirty="0">
+                <a:ln>
+                  <a:noFill/>
+                </a:ln>
+                <a:solidFill>
+                  <a:prstClr val="white"/>
+                </a:solidFill>
+                <a:effectLst>
+                  <a:outerShdw blurRad="50800" dist="38100" dir="2700000" algn="tl" rotWithShape="0">
+                    <a:prstClr val="black">
+                      <a:alpha val="40000"/>
+                    </a:prstClr>
+                  </a:outerShdw>
+                </a:effectLst>
+                <a:uLnTx/>
+                <a:uFillTx/>
+                <a:latin typeface="Century Gothic"/>
+                <a:cs typeface="Century Gothic"/>
+                <a:sym typeface="Gill Sans" charset="0"/>
+              </a:rPr>
+              <a:t>zingen</a:t>
+            </a:r>
+          </a:p>
+        </p:txBody>
+      </p:sp>
+      <p:sp>
+        <p:nvSpPr>
+          <p:cNvPr id="3" name="Tekstvak 2">
+            <a:extLst>
+              <a:ext uri="{FF2B5EF4-FFF2-40B4-BE49-F238E27FC236}">
+                <a16:creationId xmlns:a16="http://schemas.microsoft.com/office/drawing/2014/main" id="{3296212D-612F-AF9A-EDFC-55E3DDEEB8FE}"/>
+              </a:ext>
+            </a:extLst>
+          </p:cNvPr>
+          <p:cNvSpPr txBox="1">
+            <a:spLocks noChangeArrowheads="1"/>
+          </p:cNvSpPr>
+          <p:nvPr/>
+        </p:nvSpPr>
+        <p:spPr bwMode="auto">
+          <a:xfrm>
+            <a:off x="2091266" y="2708796"/>
+            <a:ext cx="8009468" cy="1458861"/>
+          </a:xfrm>
+          <a:prstGeom prst="rect">
+            <a:avLst/>
+          </a:prstGeom>
+          <a:noFill/>
+          <a:ln>
+            <a:noFill/>
+          </a:ln>
+          <a:extLst>
+            <a:ext uri="{909E8E84-426E-40dd-AFC4-6F175D3DCCD1}">
+              <a14:hiddenFill xmlns:a14="http://schemas.microsoft.com/office/drawing/2010/main" xmlns="">
+                <a:solidFill>
+                  <a:srgbClr val="FFFFFF"/>
+                </a:solidFill>
+              </a14:hiddenFill>
+            </a:ext>
+            <a:ext uri="{91240B29-F687-4f45-9708-019B960494DF}">
+              <a14:hiddenLine xmlns:a14="http://schemas.microsoft.com/office/drawing/2010/main" xmlns="" w="9525">
+                <a:solidFill>
+                  <a:srgbClr val="000000"/>
+                </a:solidFill>
+                <a:miter lim="800000"/>
+                <a:headEnd/>
+                <a:tailEnd/>
+              </a14:hiddenLine>
+            </a:ext>
+          </a:extLst>
+        </p:spPr>
+        <p:txBody>
+          <a:bodyPr wrap="square">
+            <a:spAutoFit/>
+          </a:bodyPr>
+          <a:lstStyle>
+            <a:lvl1pPr marL="342900" indent="-342900" eaLnBrk="0" hangingPunct="0">
+              <a:tabLst>
+                <a:tab pos="1878013" algn="l"/>
+              </a:tabLst>
+              <a:defRPr sz="5600">
+                <a:solidFill>
+                  <a:srgbClr val="000000"/>
+                </a:solidFill>
+                <a:latin typeface="Gill Sans" charset="0"/>
+                <a:ea typeface="ヒラギノ角ゴ ProN W3" charset="0"/>
+                <a:cs typeface="ヒラギノ角ゴ ProN W3" charset="0"/>
+                <a:sym typeface="Gill Sans" charset="0"/>
+              </a:defRPr>
+            </a:lvl1pPr>
+            <a:lvl2pPr marL="742950" indent="-285750" eaLnBrk="0" hangingPunct="0">
+              <a:tabLst>
+                <a:tab pos="1878013" algn="l"/>
+              </a:tabLst>
+              <a:defRPr sz="5600">
+                <a:solidFill>
+                  <a:srgbClr val="000000"/>
+                </a:solidFill>
+                <a:latin typeface="Gill Sans" charset="0"/>
+                <a:ea typeface="ヒラギノ角ゴ ProN W3" charset="0"/>
+                <a:cs typeface="ヒラギノ角ゴ ProN W3" charset="0"/>
+                <a:sym typeface="Gill Sans" charset="0"/>
+              </a:defRPr>
+            </a:lvl2pPr>
+            <a:lvl3pPr marL="1143000" indent="-228600" eaLnBrk="0" hangingPunct="0">
+              <a:tabLst>
+                <a:tab pos="1878013" algn="l"/>
+              </a:tabLst>
+              <a:defRPr sz="5600">
+                <a:solidFill>
+                  <a:srgbClr val="000000"/>
+                </a:solidFill>
+                <a:latin typeface="Gill Sans" charset="0"/>
+                <a:ea typeface="ヒラギノ角ゴ ProN W3" charset="0"/>
+                <a:cs typeface="ヒラギノ角ゴ ProN W3" charset="0"/>
+                <a:sym typeface="Gill Sans" charset="0"/>
+              </a:defRPr>
+            </a:lvl3pPr>
+            <a:lvl4pPr marL="1600200" indent="-228600" eaLnBrk="0" hangingPunct="0">
+              <a:tabLst>
+                <a:tab pos="1878013" algn="l"/>
+              </a:tabLst>
+              <a:defRPr sz="5600">
+                <a:solidFill>
+                  <a:srgbClr val="000000"/>
+                </a:solidFill>
+                <a:latin typeface="Gill Sans" charset="0"/>
+                <a:ea typeface="ヒラギノ角ゴ ProN W3" charset="0"/>
+                <a:cs typeface="ヒラギノ角ゴ ProN W3" charset="0"/>
+                <a:sym typeface="Gill Sans" charset="0"/>
+              </a:defRPr>
+            </a:lvl4pPr>
+            <a:lvl5pPr marL="2057400" indent="-228600" eaLnBrk="0" hangingPunct="0">
+              <a:tabLst>
+                <a:tab pos="1878013" algn="l"/>
+              </a:tabLst>
+              <a:defRPr sz="5600">
+                <a:solidFill>
+                  <a:srgbClr val="000000"/>
+                </a:solidFill>
+                <a:latin typeface="Gill Sans" charset="0"/>
+                <a:ea typeface="ヒラギノ角ゴ ProN W3" charset="0"/>
+                <a:cs typeface="ヒラギノ角ゴ ProN W3" charset="0"/>
+                <a:sym typeface="Gill Sans" charset="0"/>
+              </a:defRPr>
+            </a:lvl5pPr>
+            <a:lvl6pPr marL="2514600" indent="-228600" algn="ctr" eaLnBrk="0" fontAlgn="base" hangingPunct="0">
+              <a:spcBef>
+                <a:spcPct val="0"/>
+              </a:spcBef>
+              <a:spcAft>
+                <a:spcPct val="0"/>
+              </a:spcAft>
+              <a:tabLst>
+                <a:tab pos="1878013" algn="l"/>
+              </a:tabLst>
+              <a:defRPr sz="5600">
+                <a:solidFill>
+                  <a:srgbClr val="000000"/>
+                </a:solidFill>
+                <a:latin typeface="Gill Sans" charset="0"/>
+                <a:ea typeface="ヒラギノ角ゴ ProN W3" charset="0"/>
+                <a:cs typeface="ヒラギノ角ゴ ProN W3" charset="0"/>
+                <a:sym typeface="Gill Sans" charset="0"/>
+              </a:defRPr>
+            </a:lvl6pPr>
+            <a:lvl7pPr marL="2971800" indent="-228600" algn="ctr" eaLnBrk="0" fontAlgn="base" hangingPunct="0">
+              <a:spcBef>
+                <a:spcPct val="0"/>
+              </a:spcBef>
+              <a:spcAft>
+                <a:spcPct val="0"/>
+              </a:spcAft>
+              <a:tabLst>
+                <a:tab pos="1878013" algn="l"/>
+              </a:tabLst>
+              <a:defRPr sz="5600">
+                <a:solidFill>
+                  <a:srgbClr val="000000"/>
+                </a:solidFill>
+                <a:latin typeface="Gill Sans" charset="0"/>
+                <a:ea typeface="ヒラギノ角ゴ ProN W3" charset="0"/>
+                <a:cs typeface="ヒラギノ角ゴ ProN W3" charset="0"/>
+                <a:sym typeface="Gill Sans" charset="0"/>
+              </a:defRPr>
+            </a:lvl7pPr>
+            <a:lvl8pPr marL="3429000" indent="-228600" algn="ctr" eaLnBrk="0" fontAlgn="base" hangingPunct="0">
+              <a:spcBef>
+                <a:spcPct val="0"/>
+              </a:spcBef>
+              <a:spcAft>
+                <a:spcPct val="0"/>
+              </a:spcAft>
+              <a:tabLst>
+                <a:tab pos="1878013" algn="l"/>
+              </a:tabLst>
+              <a:defRPr sz="5600">
+                <a:solidFill>
+                  <a:srgbClr val="000000"/>
+                </a:solidFill>
+                <a:latin typeface="Gill Sans" charset="0"/>
+                <a:ea typeface="ヒラギノ角ゴ ProN W3" charset="0"/>
+                <a:cs typeface="ヒラギノ角ゴ ProN W3" charset="0"/>
+                <a:sym typeface="Gill Sans" charset="0"/>
+              </a:defRPr>
+            </a:lvl8pPr>
+            <a:lvl9pPr marL="3886200" indent="-228600" algn="ctr" eaLnBrk="0" fontAlgn="base" hangingPunct="0">
+              <a:spcBef>
+                <a:spcPct val="0"/>
+              </a:spcBef>
+              <a:spcAft>
+                <a:spcPct val="0"/>
+              </a:spcAft>
+              <a:tabLst>
+                <a:tab pos="1878013" algn="l"/>
+              </a:tabLst>
+              <a:defRPr sz="5600">
+                <a:solidFill>
+                  <a:srgbClr val="000000"/>
+                </a:solidFill>
+                <a:latin typeface="Gill Sans" charset="0"/>
+                <a:ea typeface="ヒラギノ角ゴ ProN W3" charset="0"/>
+                <a:cs typeface="ヒラギノ角ゴ ProN W3" charset="0"/>
+                <a:sym typeface="Gill Sans" charset="0"/>
+              </a:defRPr>
+            </a:lvl9pPr>
+          </a:lstStyle>
+          <a:p>
+            <a:pPr marL="342900" marR="0" lvl="0" indent="-342900" algn="ctr" defTabSz="914400" rtl="0" eaLnBrk="0" fontAlgn="auto" latinLnBrk="0" hangingPunct="0">
+              <a:lnSpc>
+                <a:spcPct val="80000"/>
+              </a:lnSpc>
+              <a:spcBef>
+                <a:spcPts val="0"/>
+              </a:spcBef>
+              <a:spcAft>
+                <a:spcPts val="0"/>
+              </a:spcAft>
+              <a:buClrTx/>
+              <a:buSzTx/>
+              <a:buFontTx/>
+              <a:buNone/>
+              <a:tabLst>
+                <a:tab pos="1878013" algn="l"/>
+              </a:tabLst>
+              <a:defRPr/>
+            </a:pPr>
+            <a:r>
+              <a:rPr kumimoji="0" lang="nl-NL" sz="7000" b="0" i="1" u="none" strike="noStrike" kern="1200" cap="none" spc="0" normalizeH="0" baseline="0" noProof="0" dirty="0">
+                <a:ln>
+                  <a:noFill/>
+                </a:ln>
+                <a:solidFill>
+                  <a:prstClr val="white"/>
+                </a:solidFill>
+                <a:effectLst>
+                  <a:outerShdw blurRad="50800" dist="38100" dir="2700000" algn="tl" rotWithShape="0">
+                    <a:prstClr val="black">
+                      <a:alpha val="40000"/>
+                    </a:prstClr>
+                  </a:outerShdw>
+                </a:effectLst>
+                <a:uLnTx/>
+                <a:uFillTx/>
+                <a:latin typeface="Klinic Slab Book" pitchFamily="2" charset="0"/>
+                <a:cs typeface="Century Gothic"/>
+                <a:sym typeface="Gill Sans" charset="0"/>
+              </a:rPr>
+              <a:t>{{Titel}}</a:t>
+            </a:r>
+          </a:p>
+          <a:p>
+            <a:pPr marL="342900" marR="0" lvl="0" indent="-342900" algn="ctr" defTabSz="914400" rtl="0" eaLnBrk="0" fontAlgn="auto" latinLnBrk="0" hangingPunct="0">
+              <a:lnSpc>
+                <a:spcPct val="80000"/>
+              </a:lnSpc>
+              <a:spcBef>
+                <a:spcPts val="0"/>
+              </a:spcBef>
+              <a:spcAft>
+                <a:spcPts val="0"/>
+              </a:spcAft>
+              <a:buClrTx/>
+              <a:buSzTx/>
+              <a:buFontTx/>
+              <a:buNone/>
+              <a:tabLst>
+                <a:tab pos="1878013" algn="l"/>
+              </a:tabLst>
+              <a:defRPr/>
+            </a:pPr>
+            <a:r>
+              <a:rPr kumimoji="0" lang="nl-NL" sz="4000" b="1" i="1" u="none" strike="noStrike" kern="1200" cap="none" spc="0" normalizeH="0" baseline="0" noProof="0" dirty="0">
+                <a:ln>
+                  <a:noFill/>
+                </a:ln>
+                <a:solidFill>
+                  <a:prstClr val="white"/>
+                </a:solidFill>
+                <a:effectLst>
+                  <a:outerShdw blurRad="50800" dist="38100" dir="2700000" algn="tl" rotWithShape="0">
+                    <a:prstClr val="black">
+                      <a:alpha val="40000"/>
+                    </a:prstClr>
+                  </a:outerShdw>
+                </a:effectLst>
+                <a:uLnTx/>
+                <a:uFillTx/>
+                <a:latin typeface="Klinic Slab Book" pitchFamily="2" charset="0"/>
+                <a:cs typeface="Century Gothic"/>
+                <a:sym typeface="Gill Sans" charset="0"/>
+              </a:rPr>
+              <a:t>{{Ondertitel}}</a:t>
+            </a:r>
+          </a:p>
+        </p:txBody>
+      </p:sp>
+    </p:spTree>
+    <p:extLst>
+      <p:ext uri="{BB962C8B-B14F-4D97-AF65-F5344CB8AC3E}">
+        <p14:creationId xmlns:p14="http://schemas.microsoft.com/office/powerpoint/2010/main" val="304069324"/>
+      </p:ext>
+    </p:extLst>
+  </p:cSld>
+  <p:clrMapOvr>
+    <a:masterClrMapping/>
+  </p:clrMapOvr>
+</p:sld>
+</file>
+
+<file path=ppt/slides/slide2.xml><?xml version="1.0" encoding="utf-8"?>
+<p:sld xmlns:a="http://schemas.openxmlformats.org/drawingml/2006/main" xmlns:r="http://schemas.openxmlformats.org/officeDocument/2006/relationships" xmlns:p="http://schemas.openxmlformats.org/presentationml/2006/main">
   <p:cSld>
     <p:spTree>
       <p:nvGrpSpPr>
@@ -4947,136 +8201,10 @@
           <a:lstStyle/>
           <a:p>
             <a:r>
-              <a:rPr lang="nl-NL" dirty="0"/>
-              <a:t>{{ondertiteling}}</a:t>
+              <a:rPr lang="nl-NL"/>
+              <a:t>{{Liedtekst}}</a:t>
             </a:r>
-          </a:p>
-        </p:txBody>
-      </p:sp>
-    </p:spTree>
-    <p:extLst>
-      <p:ext uri="{BB962C8B-B14F-4D97-AF65-F5344CB8AC3E}">
-        <p14:creationId xmlns:p14="http://schemas.microsoft.com/office/powerpoint/2010/main" val="367730310"/>
-      </p:ext>
-    </p:extLst>
-  </p:cSld>
-  <p:clrMapOvr>
-    <a:masterClrMapping/>
-  </p:clrMapOvr>
-</p:sld>
-</file>
-
-<file path=ppt/slides/slide2.xml><?xml version="1.0" encoding="utf-8"?>
-<p:sld xmlns:a16="http://schemas.microsoft.com/office/drawing/2014/main" xmlns:p14="http://schemas.microsoft.com/office/powerpoint/2010/main" xmlns:a="http://schemas.openxmlformats.org/drawingml/2006/main" xmlns:r="http://schemas.openxmlformats.org/officeDocument/2006/relationships" xmlns:p="http://schemas.openxmlformats.org/presentationml/2006/main">
-  <p:cSld>
-    <p:spTree>
-      <p:nvGrpSpPr>
-        <p:cNvPr id="1" name=""/>
-        <p:cNvGrpSpPr/>
-        <p:nvPr/>
-      </p:nvGrpSpPr>
-      <p:grpSpPr>
-        <a:xfrm>
-          <a:off x="0" y="0"/>
-          <a:ext cx="0" cy="0"/>
-          <a:chOff x="0" y="0"/>
-          <a:chExt cx="0" cy="0"/>
-        </a:xfrm>
-      </p:grpSpPr>
-      <p:sp>
-        <p:nvSpPr>
-          <p:cNvPr id="2" name="Titel 1">
-            <a:extLst>
-              <a:ext uri="{FF2B5EF4-FFF2-40B4-BE49-F238E27FC236}">
-                <a16:creationId xmlns:a16="http://schemas.microsoft.com/office/drawing/2014/main" id="{72744947-FD43-940C-6C1E-0CDE8A056130}"/>
-              </a:ext>
-            </a:extLst>
-          </p:cNvPr>
-          <p:cNvSpPr>
-            <a:spLocks noGrp="1"/>
-          </p:cNvSpPr>
-          <p:nvPr>
-            <p:ph type="title"/>
-          </p:nvPr>
-        </p:nvSpPr>
-        <p:spPr>
-          <a:xfrm>
-            <a:off x="838200" y="5233458"/>
-            <a:ext cx="10515600" cy="1325563"/>
-          </a:xfrm>
-        </p:spPr>
-        <p:txBody>
-          <a:bodyPr/>
-          <a:lstStyle/>
-          <a:p>
-            <a:r>
-              <a:rPr lang="nl-NL" dirty="0"/>
-              <a:t>Eerste regel,
-Tweede regel,</a:t>
-            </a:r>
-          </a:p>
-        </p:txBody>
-      </p:sp>
-    </p:spTree>
-    <p:extLst>
-      <p:ext uri="{BB962C8B-B14F-4D97-AF65-F5344CB8AC3E}">
-        <p14:creationId xmlns:p14="http://schemas.microsoft.com/office/powerpoint/2010/main" val="367730310"/>
-      </p:ext>
-    </p:extLst>
-  </p:cSld>
-  <p:clrMapOvr>
-    <a:masterClrMapping/>
-  </p:clrMapOvr>
-</p:sld>
-</file>
-
-<file path=ppt/slides/slide3.xml><?xml version="1.0" encoding="utf-8"?>
-<p:sld xmlns:a16="http://schemas.microsoft.com/office/drawing/2014/main" xmlns:p14="http://schemas.microsoft.com/office/powerpoint/2010/main" xmlns:a="http://schemas.openxmlformats.org/drawingml/2006/main" xmlns:r="http://schemas.openxmlformats.org/officeDocument/2006/relationships" xmlns:p="http://schemas.openxmlformats.org/presentationml/2006/main">
-  <p:cSld>
-    <p:spTree>
-      <p:nvGrpSpPr>
-        <p:cNvPr id="1" name=""/>
-        <p:cNvGrpSpPr/>
-        <p:nvPr/>
-      </p:nvGrpSpPr>
-      <p:grpSpPr>
-        <a:xfrm>
-          <a:off x="0" y="0"/>
-          <a:ext cx="0" cy="0"/>
-          <a:chOff x="0" y="0"/>
-          <a:chExt cx="0" cy="0"/>
-        </a:xfrm>
-      </p:grpSpPr>
-      <p:sp>
-        <p:nvSpPr>
-          <p:cNvPr id="2" name="Titel 1">
-            <a:extLst>
-              <a:ext uri="{FF2B5EF4-FFF2-40B4-BE49-F238E27FC236}">
-                <a16:creationId xmlns:a16="http://schemas.microsoft.com/office/drawing/2014/main" id="{72744947-FD43-940C-6C1E-0CDE8A056130}"/>
-              </a:ext>
-            </a:extLst>
-          </p:cNvPr>
-          <p:cNvSpPr>
-            <a:spLocks noGrp="1"/>
-          </p:cNvSpPr>
-          <p:nvPr>
-            <p:ph type="title"/>
-          </p:nvPr>
-        </p:nvSpPr>
-        <p:spPr>
-          <a:xfrm>
-            <a:off x="838200" y="5233458"/>
-            <a:ext cx="10515600" cy="1325563"/>
-          </a:xfrm>
-        </p:spPr>
-        <p:txBody>
-          <a:bodyPr/>
-          <a:lstStyle/>
-          <a:p>
-            <a:r>
-              <a:rPr lang="nl-NL" dirty="0"/>
-              <a:t>Derde regel</a:t>
-            </a:r>
+            <a:endParaRPr lang="nl-NL" dirty="0"/>
           </a:p>
         </p:txBody>
       </p:sp>
@@ -5389,6 +8517,301 @@
 </file>
 
 <file path=ppt/theme/theme2.xml><?xml version="1.0" encoding="utf-8"?>
+<a:theme xmlns:a="http://schemas.openxmlformats.org/drawingml/2006/main" name="Kantoorthema">
+  <a:themeElements>
+    <a:clrScheme name="Office">
+      <a:dk1>
+        <a:sysClr val="windowText" lastClr="000000"/>
+      </a:dk1>
+      <a:lt1>
+        <a:sysClr val="window" lastClr="FFFFFF"/>
+      </a:lt1>
+      <a:dk2>
+        <a:srgbClr val="44546A"/>
+      </a:dk2>
+      <a:lt2>
+        <a:srgbClr val="E7E6E6"/>
+      </a:lt2>
+      <a:accent1>
+        <a:srgbClr val="4472C4"/>
+      </a:accent1>
+      <a:accent2>
+        <a:srgbClr val="ED7D31"/>
+      </a:accent2>
+      <a:accent3>
+        <a:srgbClr val="A5A5A5"/>
+      </a:accent3>
+      <a:accent4>
+        <a:srgbClr val="FFC000"/>
+      </a:accent4>
+      <a:accent5>
+        <a:srgbClr val="5B9BD5"/>
+      </a:accent5>
+      <a:accent6>
+        <a:srgbClr val="70AD47"/>
+      </a:accent6>
+      <a:hlink>
+        <a:srgbClr val="0563C1"/>
+      </a:hlink>
+      <a:folHlink>
+        <a:srgbClr val="954F72"/>
+      </a:folHlink>
+    </a:clrScheme>
+    <a:fontScheme name="Office">
+      <a:majorFont>
+        <a:latin typeface="Calibri Light" panose="020F0302020204030204"/>
+        <a:ea typeface=""/>
+        <a:cs typeface=""/>
+        <a:font script="Jpan" typeface="游ゴシック Light"/>
+        <a:font script="Hang" typeface="맑은 고딕"/>
+        <a:font script="Hans" typeface="等线 Light"/>
+        <a:font script="Hant" typeface="新細明體"/>
+        <a:font script="Arab" typeface="Times New Roman"/>
+        <a:font script="Hebr" typeface="Times New Roman"/>
+        <a:font script="Thai" typeface="Angsana New"/>
+        <a:font script="Ethi" typeface="Nyala"/>
+        <a:font script="Beng" typeface="Vrinda"/>
+        <a:font script="Gujr" typeface="Shruti"/>
+        <a:font script="Khmr" typeface="MoolBoran"/>
+        <a:font script="Knda" typeface="Tunga"/>
+        <a:font script="Guru" typeface="Raavi"/>
+        <a:font script="Cans" typeface="Euphemia"/>
+        <a:font script="Cher" typeface="Plantagenet Cherokee"/>
+        <a:font script="Yiii" typeface="Microsoft Yi Baiti"/>
+        <a:font script="Tibt" typeface="Microsoft Himalaya"/>
+        <a:font script="Thaa" typeface="MV Boli"/>
+        <a:font script="Deva" typeface="Mangal"/>
+        <a:font script="Telu" typeface="Gautami"/>
+        <a:font script="Taml" typeface="Latha"/>
+        <a:font script="Syrc" typeface="Estrangelo Edessa"/>
+        <a:font script="Orya" typeface="Kalinga"/>
+        <a:font script="Mlym" typeface="Kartika"/>
+        <a:font script="Laoo" typeface="DokChampa"/>
+        <a:font script="Sinh" typeface="Iskoola Pota"/>
+        <a:font script="Mong" typeface="Mongolian Baiti"/>
+        <a:font script="Viet" typeface="Times New Roman"/>
+        <a:font script="Uigh" typeface="Microsoft Uighur"/>
+        <a:font script="Geor" typeface="Sylfaen"/>
+        <a:font script="Armn" typeface="Arial"/>
+        <a:font script="Bugi" typeface="Leelawadee UI"/>
+        <a:font script="Bopo" typeface="Microsoft JhengHei"/>
+        <a:font script="Java" typeface="Javanese Text"/>
+        <a:font script="Lisu" typeface="Segoe UI"/>
+        <a:font script="Mymr" typeface="Myanmar Text"/>
+        <a:font script="Nkoo" typeface="Ebrima"/>
+        <a:font script="Olck" typeface="Nirmala UI"/>
+        <a:font script="Osma" typeface="Ebrima"/>
+        <a:font script="Phag" typeface="Phagspa"/>
+        <a:font script="Syrn" typeface="Estrangelo Edessa"/>
+        <a:font script="Syrj" typeface="Estrangelo Edessa"/>
+        <a:font script="Syre" typeface="Estrangelo Edessa"/>
+        <a:font script="Sora" typeface="Nirmala UI"/>
+        <a:font script="Tale" typeface="Microsoft Tai Le"/>
+        <a:font script="Talu" typeface="Microsoft New Tai Lue"/>
+        <a:font script="Tfng" typeface="Ebrima"/>
+      </a:majorFont>
+      <a:minorFont>
+        <a:latin typeface="Calibri" panose="020F0502020204030204"/>
+        <a:ea typeface=""/>
+        <a:cs typeface=""/>
+        <a:font script="Jpan" typeface="游ゴシック"/>
+        <a:font script="Hang" typeface="맑은 고딕"/>
+        <a:font script="Hans" typeface="等线"/>
+        <a:font script="Hant" typeface="新細明體"/>
+        <a:font script="Arab" typeface="Arial"/>
+        <a:font script="Hebr" typeface="Arial"/>
+        <a:font script="Thai" typeface="Cordia New"/>
+        <a:font script="Ethi" typeface="Nyala"/>
+        <a:font script="Beng" typeface="Vrinda"/>
+        <a:font script="Gujr" typeface="Shruti"/>
+        <a:font script="Khmr" typeface="DaunPenh"/>
+        <a:font script="Knda" typeface="Tunga"/>
+        <a:font script="Guru" typeface="Raavi"/>
+        <a:font script="Cans" typeface="Euphemia"/>
+        <a:font script="Cher" typeface="Plantagenet Cherokee"/>
+        <a:font script="Yiii" typeface="Microsoft Yi Baiti"/>
+        <a:font script="Tibt" typeface="Microsoft Himalaya"/>
+        <a:font script="Thaa" typeface="MV Boli"/>
+        <a:font script="Deva" typeface="Mangal"/>
+        <a:font script="Telu" typeface="Gautami"/>
+        <a:font script="Taml" typeface="Latha"/>
+        <a:font script="Syrc" typeface="Estrangelo Edessa"/>
+        <a:font script="Orya" typeface="Kalinga"/>
+        <a:font script="Mlym" typeface="Kartika"/>
+        <a:font script="Laoo" typeface="DokChampa"/>
+        <a:font script="Sinh" typeface="Iskoola Pota"/>
+        <a:font script="Mong" typeface="Mongolian Baiti"/>
+        <a:font script="Viet" typeface="Arial"/>
+        <a:font script="Uigh" typeface="Microsoft Uighur"/>
+        <a:font script="Geor" typeface="Sylfaen"/>
+        <a:font script="Armn" typeface="Arial"/>
+        <a:font script="Bugi" typeface="Leelawadee UI"/>
+        <a:font script="Bopo" typeface="Microsoft JhengHei"/>
+        <a:font script="Java" typeface="Javanese Text"/>
+        <a:font script="Lisu" typeface="Segoe UI"/>
+        <a:font script="Mymr" typeface="Myanmar Text"/>
+        <a:font script="Nkoo" typeface="Ebrima"/>
+        <a:font script="Olck" typeface="Nirmala UI"/>
+        <a:font script="Osma" typeface="Ebrima"/>
+        <a:font script="Phag" typeface="Phagspa"/>
+        <a:font script="Syrn" typeface="Estrangelo Edessa"/>
+        <a:font script="Syrj" typeface="Estrangelo Edessa"/>
+        <a:font script="Syre" typeface="Estrangelo Edessa"/>
+        <a:font script="Sora" typeface="Nirmala UI"/>
+        <a:font script="Tale" typeface="Microsoft Tai Le"/>
+        <a:font script="Talu" typeface="Microsoft New Tai Lue"/>
+        <a:font script="Tfng" typeface="Ebrima"/>
+      </a:minorFont>
+    </a:fontScheme>
+    <a:fmtScheme name="Office">
+      <a:fillStyleLst>
+        <a:solidFill>
+          <a:schemeClr val="phClr"/>
+        </a:solidFill>
+        <a:gradFill rotWithShape="1">
+          <a:gsLst>
+            <a:gs pos="0">
+              <a:schemeClr val="phClr">
+                <a:lumMod val="110000"/>
+                <a:satMod val="105000"/>
+                <a:tint val="67000"/>
+              </a:schemeClr>
+            </a:gs>
+            <a:gs pos="50000">
+              <a:schemeClr val="phClr">
+                <a:lumMod val="105000"/>
+                <a:satMod val="103000"/>
+                <a:tint val="73000"/>
+              </a:schemeClr>
+            </a:gs>
+            <a:gs pos="100000">
+              <a:schemeClr val="phClr">
+                <a:lumMod val="105000"/>
+                <a:satMod val="109000"/>
+                <a:tint val="81000"/>
+              </a:schemeClr>
+            </a:gs>
+          </a:gsLst>
+          <a:lin ang="5400000" scaled="0"/>
+        </a:gradFill>
+        <a:gradFill rotWithShape="1">
+          <a:gsLst>
+            <a:gs pos="0">
+              <a:schemeClr val="phClr">
+                <a:satMod val="103000"/>
+                <a:lumMod val="102000"/>
+                <a:tint val="94000"/>
+              </a:schemeClr>
+            </a:gs>
+            <a:gs pos="50000">
+              <a:schemeClr val="phClr">
+                <a:satMod val="110000"/>
+                <a:lumMod val="100000"/>
+                <a:shade val="100000"/>
+              </a:schemeClr>
+            </a:gs>
+            <a:gs pos="100000">
+              <a:schemeClr val="phClr">
+                <a:lumMod val="99000"/>
+                <a:satMod val="120000"/>
+                <a:shade val="78000"/>
+              </a:schemeClr>
+            </a:gs>
+          </a:gsLst>
+          <a:lin ang="5400000" scaled="0"/>
+        </a:gradFill>
+      </a:fillStyleLst>
+      <a:lnStyleLst>
+        <a:ln w="6350" cap="flat" cmpd="sng" algn="ctr">
+          <a:solidFill>
+            <a:schemeClr val="phClr"/>
+          </a:solidFill>
+          <a:prstDash val="solid"/>
+          <a:miter lim="800000"/>
+        </a:ln>
+        <a:ln w="12700" cap="flat" cmpd="sng" algn="ctr">
+          <a:solidFill>
+            <a:schemeClr val="phClr"/>
+          </a:solidFill>
+          <a:prstDash val="solid"/>
+          <a:miter lim="800000"/>
+        </a:ln>
+        <a:ln w="19050" cap="flat" cmpd="sng" algn="ctr">
+          <a:solidFill>
+            <a:schemeClr val="phClr"/>
+          </a:solidFill>
+          <a:prstDash val="solid"/>
+          <a:miter lim="800000"/>
+        </a:ln>
+      </a:lnStyleLst>
+      <a:effectStyleLst>
+        <a:effectStyle>
+          <a:effectLst/>
+        </a:effectStyle>
+        <a:effectStyle>
+          <a:effectLst/>
+        </a:effectStyle>
+        <a:effectStyle>
+          <a:effectLst>
+            <a:outerShdw blurRad="57150" dist="19050" dir="5400000" algn="ctr" rotWithShape="0">
+              <a:srgbClr val="000000">
+                <a:alpha val="63000"/>
+              </a:srgbClr>
+            </a:outerShdw>
+          </a:effectLst>
+        </a:effectStyle>
+      </a:effectStyleLst>
+      <a:bgFillStyleLst>
+        <a:solidFill>
+          <a:schemeClr val="phClr"/>
+        </a:solidFill>
+        <a:solidFill>
+          <a:schemeClr val="phClr">
+            <a:tint val="95000"/>
+            <a:satMod val="170000"/>
+          </a:schemeClr>
+        </a:solidFill>
+        <a:gradFill rotWithShape="1">
+          <a:gsLst>
+            <a:gs pos="0">
+              <a:schemeClr val="phClr">
+                <a:tint val="93000"/>
+                <a:satMod val="150000"/>
+                <a:shade val="98000"/>
+                <a:lumMod val="102000"/>
+              </a:schemeClr>
+            </a:gs>
+            <a:gs pos="50000">
+              <a:schemeClr val="phClr">
+                <a:tint val="98000"/>
+                <a:satMod val="130000"/>
+                <a:shade val="90000"/>
+                <a:lumMod val="103000"/>
+              </a:schemeClr>
+            </a:gs>
+            <a:gs pos="100000">
+              <a:schemeClr val="phClr">
+                <a:shade val="63000"/>
+                <a:satMod val="120000"/>
+              </a:schemeClr>
+            </a:gs>
+          </a:gsLst>
+          <a:lin ang="5400000" scaled="0"/>
+        </a:gradFill>
+      </a:bgFillStyleLst>
+    </a:fmtScheme>
+  </a:themeElements>
+  <a:objectDefaults/>
+  <a:extraClrSchemeLst/>
+  <a:extLst>
+    <a:ext uri="{05A4C25C-085E-4340-85A3-A5531E510DB2}">
+      <thm15:themeFamily xmlns:thm15="http://schemas.microsoft.com/office/thememl/2012/main" name="Office Theme" id="{62F939B6-93AF-4DB8-9C6B-D6C7DFDC589F}" vid="{4A3C46E8-61CC-4603-A589-7422A47A8E4A}"/>
+    </a:ext>
+  </a:extLst>
+</a:theme>
+</file>
+
+<file path=ppt/theme/theme3.xml><?xml version="1.0" encoding="utf-8"?>
 <a:theme xmlns:a="http://schemas.openxmlformats.org/drawingml/2006/main" name="Office Theme">
   <a:themeElements>
     <a:clrScheme name="Office">
@@ -5684,6 +9107,12 @@
 </file>
 
 <file path=customXml/item1.xml><?xml version="1.0" encoding="utf-8"?>
+<p:properties xmlns:p="http://schemas.microsoft.com/office/2006/metadata/properties" xmlns:xsi="http://www.w3.org/2001/XMLSchema-instance" xmlns:pc="http://schemas.microsoft.com/office/infopath/2007/PartnerControls">
+  <documentManagement/>
+</p:properties>
+</file>
+
+<file path=customXml/item2.xml><?xml version="1.0" encoding="utf-8"?>
 <ct:contentTypeSchema xmlns:ct="http://schemas.microsoft.com/office/2006/metadata/contentType" xmlns:ma="http://schemas.microsoft.com/office/2006/metadata/properties/metaAttributes" ct:_="" ma:_="" ma:contentTypeName="Document" ma:contentTypeID="0x010100CA53E45184BAE24091CC038DE5589C70" ma:contentTypeVersion="13" ma:contentTypeDescription="Een nieuw document maken." ma:contentTypeScope="" ma:versionID="51e52146d5e41f5e409cd0d2f2cb7670">
   <xsd:schema xmlns:xsd="http://www.w3.org/2001/XMLSchema" xmlns:xs="http://www.w3.org/2001/XMLSchema" xmlns:p="http://schemas.microsoft.com/office/2006/metadata/properties" xmlns:ns2="1f55d0c4-05aa-4c2b-a57a-4eab3d02d34b" xmlns:ns3="b3eb6833-ff68-4673-b07f-ad406614af1d" targetNamespace="http://schemas.microsoft.com/office/2006/metadata/properties" ma:root="true" ma:fieldsID="d1695e23627906da0dbf9bfeff99aa39" ns2:_="" ns3:_="">
     <xsd:import namespace="1f55d0c4-05aa-4c2b-a57a-4eab3d02d34b"/>
@@ -5904,12 +9333,6 @@
 </ct:contentTypeSchema>
 </file>
 
-<file path=customXml/item2.xml><?xml version="1.0" encoding="utf-8"?>
-<p:properties xmlns:p="http://schemas.microsoft.com/office/2006/metadata/properties" xmlns:xsi="http://www.w3.org/2001/XMLSchema-instance" xmlns:pc="http://schemas.microsoft.com/office/infopath/2007/PartnerControls">
-  <documentManagement/>
-</p:properties>
-</file>
-
 <file path=customXml/item3.xml><?xml version="1.0" encoding="utf-8"?>
 <?mso-contentType ?>
 <FormTemplates xmlns="http://schemas.microsoft.com/sharepoint/v3/contenttype/forms">
@@ -5920,6 +9343,23 @@
 </file>
 
 <file path=customXml/itemProps1.xml><?xml version="1.0" encoding="utf-8"?>
+<ds:datastoreItem xmlns:ds="http://schemas.openxmlformats.org/officeDocument/2006/customXml" ds:itemID="{20626E32-2ADB-4FF9-84DA-2C3ECEB4C5E8}">
+  <ds:schemaRefs>
+    <ds:schemaRef ds:uri="http://schemas.microsoft.com/office/2006/metadata/properties"/>
+    <ds:schemaRef ds:uri="http://purl.org/dc/terms/"/>
+    <ds:schemaRef ds:uri="http://purl.org/dc/elements/1.1/"/>
+    <ds:schemaRef ds:uri="b3eb6833-ff68-4673-b07f-ad406614af1d"/>
+    <ds:schemaRef ds:uri="http://schemas.microsoft.com/office/2006/documentManagement/types"/>
+    <ds:schemaRef ds:uri="http://purl.org/dc/dcmitype/"/>
+    <ds:schemaRef ds:uri="http://www.w3.org/XML/1998/namespace"/>
+    <ds:schemaRef ds:uri="http://schemas.microsoft.com/office/infopath/2007/PartnerControls"/>
+    <ds:schemaRef ds:uri="http://schemas.openxmlformats.org/package/2006/metadata/core-properties"/>
+    <ds:schemaRef ds:uri="1f55d0c4-05aa-4c2b-a57a-4eab3d02d34b"/>
+  </ds:schemaRefs>
+</ds:datastoreItem>
+</file>
+
+<file path=customXml/itemProps2.xml><?xml version="1.0" encoding="utf-8"?>
 <ds:datastoreItem xmlns:ds="http://schemas.openxmlformats.org/officeDocument/2006/customXml" ds:itemID="{5A05B009-6AA1-4FD0-9AEA-EF092A6040CA}">
   <ds:schemaRefs>
     <ds:schemaRef ds:uri="http://schemas.microsoft.com/office/2006/metadata/contentType"/>
@@ -5938,23 +9378,6 @@
 </ds:datastoreItem>
 </file>
 
-<file path=customXml/itemProps2.xml><?xml version="1.0" encoding="utf-8"?>
-<ds:datastoreItem xmlns:ds="http://schemas.openxmlformats.org/officeDocument/2006/customXml" ds:itemID="{20626E32-2ADB-4FF9-84DA-2C3ECEB4C5E8}">
-  <ds:schemaRefs>
-    <ds:schemaRef ds:uri="http://schemas.microsoft.com/office/2006/metadata/properties"/>
-    <ds:schemaRef ds:uri="http://purl.org/dc/terms/"/>
-    <ds:schemaRef ds:uri="http://purl.org/dc/elements/1.1/"/>
-    <ds:schemaRef ds:uri="b3eb6833-ff68-4673-b07f-ad406614af1d"/>
-    <ds:schemaRef ds:uri="http://schemas.microsoft.com/office/2006/documentManagement/types"/>
-    <ds:schemaRef ds:uri="http://purl.org/dc/dcmitype/"/>
-    <ds:schemaRef ds:uri="http://www.w3.org/XML/1998/namespace"/>
-    <ds:schemaRef ds:uri="http://schemas.microsoft.com/office/infopath/2007/PartnerControls"/>
-    <ds:schemaRef ds:uri="http://schemas.openxmlformats.org/package/2006/metadata/core-properties"/>
-    <ds:schemaRef ds:uri="1f55d0c4-05aa-4c2b-a57a-4eab3d02d34b"/>
-  </ds:schemaRefs>
-</ds:datastoreItem>
-</file>
-
 <file path=customXml/itemProps3.xml><?xml version="1.0" encoding="utf-8"?>
 <ds:datastoreItem xmlns:ds="http://schemas.openxmlformats.org/officeDocument/2006/customXml" ds:itemID="{2CCCBAFB-3F28-4180-989B-026E0CDE5E31}">
   <ds:schemaRefs>

</xml_diff>